<commit_message>
updated the week-7 material
</commit_message>
<xml_diff>
--- a/CSCI-111/week-7/week-7-lecture/week-7-lecture.pptx
+++ b/CSCI-111/week-7/week-7-lecture/week-7-lecture.pptx
@@ -816,7 +816,7 @@
   <p:cSld>
     <p:spTree>
       <p:nvGrpSpPr>
-        <p:cNvPr id="125" name="Shape 125"/>
+        <p:cNvPr id="124" name="Shape 124"/>
         <p:cNvGrpSpPr/>
         <p:nvPr/>
       </p:nvGrpSpPr>
@@ -830,7 +830,7 @@
       </p:grpSpPr>
       <p:sp>
         <p:nvSpPr>
-          <p:cNvPr id="126" name="Google Shape;126;g303bf7eac59_0_28:notes"/>
+          <p:cNvPr id="125" name="Google Shape;125;g303bf7eac59_0_28:notes"/>
           <p:cNvSpPr/>
           <p:nvPr>
             <p:ph idx="2" type="sldImg"/>
@@ -865,7 +865,7 @@
       </p:sp>
       <p:sp>
         <p:nvSpPr>
-          <p:cNvPr id="127" name="Google Shape;127;g303bf7eac59_0_28:notes"/>
+          <p:cNvPr id="126" name="Google Shape;126;g303bf7eac59_0_28:notes"/>
           <p:cNvSpPr txBox="1"/>
           <p:nvPr>
             <p:ph idx="1" type="body"/>
@@ -915,7 +915,7 @@
   <p:cSld>
     <p:spTree>
       <p:nvGrpSpPr>
-        <p:cNvPr id="133" name="Shape 133"/>
+        <p:cNvPr id="132" name="Shape 132"/>
         <p:cNvGrpSpPr/>
         <p:nvPr/>
       </p:nvGrpSpPr>
@@ -929,7 +929,7 @@
       </p:grpSpPr>
       <p:sp>
         <p:nvSpPr>
-          <p:cNvPr id="134" name="Google Shape;134;g303bf7eac59_0_35:notes"/>
+          <p:cNvPr id="133" name="Google Shape;133;g303bf7eac59_0_35:notes"/>
           <p:cNvSpPr/>
           <p:nvPr>
             <p:ph idx="2" type="sldImg"/>
@@ -964,7 +964,7 @@
       </p:sp>
       <p:sp>
         <p:nvSpPr>
-          <p:cNvPr id="135" name="Google Shape;135;g303bf7eac59_0_35:notes"/>
+          <p:cNvPr id="134" name="Google Shape;134;g303bf7eac59_0_35:notes"/>
           <p:cNvSpPr txBox="1"/>
           <p:nvPr>
             <p:ph idx="1" type="body"/>
@@ -1014,7 +1014,7 @@
   <p:cSld>
     <p:spTree>
       <p:nvGrpSpPr>
-        <p:cNvPr id="140" name="Shape 140"/>
+        <p:cNvPr id="139" name="Shape 139"/>
         <p:cNvGrpSpPr/>
         <p:nvPr/>
       </p:nvGrpSpPr>
@@ -1028,7 +1028,7 @@
       </p:grpSpPr>
       <p:sp>
         <p:nvSpPr>
-          <p:cNvPr id="141" name="Google Shape;141;g302e0d3426f_1_20:notes"/>
+          <p:cNvPr id="140" name="Google Shape;140;g302e0d3426f_1_20:notes"/>
           <p:cNvSpPr/>
           <p:nvPr>
             <p:ph idx="2" type="sldImg"/>
@@ -1063,7 +1063,7 @@
       </p:sp>
       <p:sp>
         <p:nvSpPr>
-          <p:cNvPr id="142" name="Google Shape;142;g302e0d3426f_1_20:notes"/>
+          <p:cNvPr id="141" name="Google Shape;141;g302e0d3426f_1_20:notes"/>
           <p:cNvSpPr txBox="1"/>
           <p:nvPr>
             <p:ph idx="1" type="body"/>
@@ -1113,7 +1113,7 @@
   <p:cSld>
     <p:spTree>
       <p:nvGrpSpPr>
-        <p:cNvPr id="147" name="Shape 147"/>
+        <p:cNvPr id="146" name="Shape 146"/>
         <p:cNvGrpSpPr/>
         <p:nvPr/>
       </p:nvGrpSpPr>
@@ -1127,7 +1127,7 @@
       </p:grpSpPr>
       <p:sp>
         <p:nvSpPr>
-          <p:cNvPr id="148" name="Google Shape;148;g302e0d3426f_1_25:notes"/>
+          <p:cNvPr id="147" name="Google Shape;147;g302e0d3426f_1_25:notes"/>
           <p:cNvSpPr/>
           <p:nvPr>
             <p:ph idx="2" type="sldImg"/>
@@ -1162,7 +1162,7 @@
       </p:sp>
       <p:sp>
         <p:nvSpPr>
-          <p:cNvPr id="149" name="Google Shape;149;g302e0d3426f_1_25:notes"/>
+          <p:cNvPr id="148" name="Google Shape;148;g302e0d3426f_1_25:notes"/>
           <p:cNvSpPr txBox="1"/>
           <p:nvPr>
             <p:ph idx="1" type="body"/>
@@ -1212,7 +1212,7 @@
   <p:cSld>
     <p:spTree>
       <p:nvGrpSpPr>
-        <p:cNvPr id="155" name="Shape 155"/>
+        <p:cNvPr id="154" name="Shape 154"/>
         <p:cNvGrpSpPr/>
         <p:nvPr/>
       </p:nvGrpSpPr>
@@ -1226,7 +1226,7 @@
       </p:grpSpPr>
       <p:sp>
         <p:nvSpPr>
-          <p:cNvPr id="156" name="Google Shape;156;g3006a2eb24e_0_85:notes"/>
+          <p:cNvPr id="155" name="Google Shape;155;g3006a2eb24e_0_85:notes"/>
           <p:cNvSpPr/>
           <p:nvPr>
             <p:ph idx="2" type="sldImg"/>
@@ -1261,7 +1261,7 @@
       </p:sp>
       <p:sp>
         <p:nvSpPr>
-          <p:cNvPr id="157" name="Google Shape;157;g3006a2eb24e_0_85:notes"/>
+          <p:cNvPr id="156" name="Google Shape;156;g3006a2eb24e_0_85:notes"/>
           <p:cNvSpPr txBox="1"/>
           <p:nvPr>
             <p:ph idx="1" type="body"/>
@@ -1311,7 +1311,7 @@
   <p:cSld>
     <p:spTree>
       <p:nvGrpSpPr>
-        <p:cNvPr id="162" name="Shape 162"/>
+        <p:cNvPr id="161" name="Shape 161"/>
         <p:cNvGrpSpPr/>
         <p:nvPr/>
       </p:nvGrpSpPr>
@@ -1325,7 +1325,7 @@
       </p:grpSpPr>
       <p:sp>
         <p:nvSpPr>
-          <p:cNvPr id="163" name="Google Shape;163;g302e0d3426f_1_3:notes"/>
+          <p:cNvPr id="162" name="Google Shape;162;g302e0d3426f_1_3:notes"/>
           <p:cNvSpPr/>
           <p:nvPr>
             <p:ph idx="2" type="sldImg"/>
@@ -1360,7 +1360,7 @@
       </p:sp>
       <p:sp>
         <p:nvSpPr>
-          <p:cNvPr id="164" name="Google Shape;164;g302e0d3426f_1_3:notes"/>
+          <p:cNvPr id="163" name="Google Shape;163;g302e0d3426f_1_3:notes"/>
           <p:cNvSpPr txBox="1"/>
           <p:nvPr>
             <p:ph idx="1" type="body"/>
@@ -1410,7 +1410,7 @@
   <p:cSld>
     <p:spTree>
       <p:nvGrpSpPr>
-        <p:cNvPr id="169" name="Shape 169"/>
+        <p:cNvPr id="168" name="Shape 168"/>
         <p:cNvGrpSpPr/>
         <p:nvPr/>
       </p:nvGrpSpPr>
@@ -1424,7 +1424,7 @@
       </p:grpSpPr>
       <p:sp>
         <p:nvSpPr>
-          <p:cNvPr id="170" name="Google Shape;170;g3006a2eb24e_0_99:notes"/>
+          <p:cNvPr id="169" name="Google Shape;169;g3006a2eb24e_0_99:notes"/>
           <p:cNvSpPr/>
           <p:nvPr>
             <p:ph idx="2" type="sldImg"/>
@@ -1459,7 +1459,7 @@
       </p:sp>
       <p:sp>
         <p:nvSpPr>
-          <p:cNvPr id="171" name="Google Shape;171;g3006a2eb24e_0_99:notes"/>
+          <p:cNvPr id="170" name="Google Shape;170;g3006a2eb24e_0_99:notes"/>
           <p:cNvSpPr txBox="1"/>
           <p:nvPr>
             <p:ph idx="1" type="body"/>
@@ -1509,7 +1509,7 @@
   <p:cSld>
     <p:spTree>
       <p:nvGrpSpPr>
-        <p:cNvPr id="175" name="Shape 175"/>
+        <p:cNvPr id="174" name="Shape 174"/>
         <p:cNvGrpSpPr/>
         <p:nvPr/>
       </p:nvGrpSpPr>
@@ -1523,7 +1523,7 @@
       </p:grpSpPr>
       <p:sp>
         <p:nvSpPr>
-          <p:cNvPr id="176" name="Google Shape;176;g3006a2eb24e_0_111:notes"/>
+          <p:cNvPr id="175" name="Google Shape;175;g3006a2eb24e_0_111:notes"/>
           <p:cNvSpPr/>
           <p:nvPr>
             <p:ph idx="2" type="sldImg"/>
@@ -1558,7 +1558,7 @@
       </p:sp>
       <p:sp>
         <p:nvSpPr>
-          <p:cNvPr id="177" name="Google Shape;177;g3006a2eb24e_0_111:notes"/>
+          <p:cNvPr id="176" name="Google Shape;176;g3006a2eb24e_0_111:notes"/>
           <p:cNvSpPr txBox="1"/>
           <p:nvPr>
             <p:ph idx="1" type="body"/>
@@ -1608,7 +1608,7 @@
   <p:cSld>
     <p:spTree>
       <p:nvGrpSpPr>
-        <p:cNvPr id="181" name="Shape 181"/>
+        <p:cNvPr id="180" name="Shape 180"/>
         <p:cNvGrpSpPr/>
         <p:nvPr/>
       </p:nvGrpSpPr>
@@ -1622,7 +1622,7 @@
       </p:grpSpPr>
       <p:sp>
         <p:nvSpPr>
-          <p:cNvPr id="182" name="Google Shape;182;g302e0d3426f_1_146:notes"/>
+          <p:cNvPr id="181" name="Google Shape;181;g302e0d3426f_1_146:notes"/>
           <p:cNvSpPr/>
           <p:nvPr>
             <p:ph idx="2" type="sldImg"/>
@@ -1657,7 +1657,7 @@
       </p:sp>
       <p:sp>
         <p:nvSpPr>
-          <p:cNvPr id="183" name="Google Shape;183;g302e0d3426f_1_146:notes"/>
+          <p:cNvPr id="182" name="Google Shape;182;g302e0d3426f_1_146:notes"/>
           <p:cNvSpPr txBox="1"/>
           <p:nvPr>
             <p:ph idx="1" type="body"/>
@@ -1707,7 +1707,7 @@
   <p:cSld>
     <p:spTree>
       <p:nvGrpSpPr>
-        <p:cNvPr id="188" name="Shape 188"/>
+        <p:cNvPr id="187" name="Shape 187"/>
         <p:cNvGrpSpPr/>
         <p:nvPr/>
       </p:nvGrpSpPr>
@@ -1721,7 +1721,7 @@
       </p:grpSpPr>
       <p:sp>
         <p:nvSpPr>
-          <p:cNvPr id="189" name="Google Shape;189;g302e0d3426f_1_151:notes"/>
+          <p:cNvPr id="188" name="Google Shape;188;g302e0d3426f_1_151:notes"/>
           <p:cNvSpPr/>
           <p:nvPr>
             <p:ph idx="2" type="sldImg"/>
@@ -1756,7 +1756,7 @@
       </p:sp>
       <p:sp>
         <p:nvSpPr>
-          <p:cNvPr id="190" name="Google Shape;190;g302e0d3426f_1_151:notes"/>
+          <p:cNvPr id="189" name="Google Shape;189;g302e0d3426f_1_151:notes"/>
           <p:cNvSpPr txBox="1"/>
           <p:nvPr>
             <p:ph idx="1" type="body"/>
@@ -1905,7 +1905,7 @@
   <p:cSld>
     <p:spTree>
       <p:nvGrpSpPr>
-        <p:cNvPr id="194" name="Shape 194"/>
+        <p:cNvPr id="193" name="Shape 193"/>
         <p:cNvGrpSpPr/>
         <p:nvPr/>
       </p:nvGrpSpPr>
@@ -1919,7 +1919,7 @@
       </p:grpSpPr>
       <p:sp>
         <p:nvSpPr>
-          <p:cNvPr id="195" name="Google Shape;195;g302e0d3426f_1_156:notes"/>
+          <p:cNvPr id="194" name="Google Shape;194;g302e0d3426f_1_156:notes"/>
           <p:cNvSpPr/>
           <p:nvPr>
             <p:ph idx="2" type="sldImg"/>
@@ -1954,7 +1954,7 @@
       </p:sp>
       <p:sp>
         <p:nvSpPr>
-          <p:cNvPr id="196" name="Google Shape;196;g302e0d3426f_1_156:notes"/>
+          <p:cNvPr id="195" name="Google Shape;195;g302e0d3426f_1_156:notes"/>
           <p:cNvSpPr txBox="1"/>
           <p:nvPr>
             <p:ph idx="1" type="body"/>
@@ -2004,7 +2004,7 @@
   <p:cSld>
     <p:spTree>
       <p:nvGrpSpPr>
-        <p:cNvPr id="201" name="Shape 201"/>
+        <p:cNvPr id="200" name="Shape 200"/>
         <p:cNvGrpSpPr/>
         <p:nvPr/>
       </p:nvGrpSpPr>
@@ -2018,7 +2018,7 @@
       </p:grpSpPr>
       <p:sp>
         <p:nvSpPr>
-          <p:cNvPr id="202" name="Google Shape;202;g302e0d3426f_1_161:notes"/>
+          <p:cNvPr id="201" name="Google Shape;201;g302e0d3426f_1_161:notes"/>
           <p:cNvSpPr/>
           <p:nvPr>
             <p:ph idx="2" type="sldImg"/>
@@ -2053,7 +2053,7 @@
       </p:sp>
       <p:sp>
         <p:nvSpPr>
-          <p:cNvPr id="203" name="Google Shape;203;g302e0d3426f_1_161:notes"/>
+          <p:cNvPr id="202" name="Google Shape;202;g302e0d3426f_1_161:notes"/>
           <p:cNvSpPr txBox="1"/>
           <p:nvPr>
             <p:ph idx="1" type="body"/>
@@ -2103,7 +2103,7 @@
   <p:cSld>
     <p:spTree>
       <p:nvGrpSpPr>
-        <p:cNvPr id="207" name="Shape 207"/>
+        <p:cNvPr id="206" name="Shape 206"/>
         <p:cNvGrpSpPr/>
         <p:nvPr/>
       </p:nvGrpSpPr>
@@ -2117,7 +2117,7 @@
       </p:grpSpPr>
       <p:sp>
         <p:nvSpPr>
-          <p:cNvPr id="208" name="Google Shape;208;g302e0d3426f_1_166:notes"/>
+          <p:cNvPr id="207" name="Google Shape;207;g302e0d3426f_1_166:notes"/>
           <p:cNvSpPr/>
           <p:nvPr>
             <p:ph idx="2" type="sldImg"/>
@@ -2152,7 +2152,7 @@
       </p:sp>
       <p:sp>
         <p:nvSpPr>
-          <p:cNvPr id="209" name="Google Shape;209;g302e0d3426f_1_166:notes"/>
+          <p:cNvPr id="208" name="Google Shape;208;g302e0d3426f_1_166:notes"/>
           <p:cNvSpPr txBox="1"/>
           <p:nvPr>
             <p:ph idx="1" type="body"/>
@@ -2202,7 +2202,7 @@
   <p:cSld>
     <p:spTree>
       <p:nvGrpSpPr>
-        <p:cNvPr id="215" name="Shape 215"/>
+        <p:cNvPr id="214" name="Shape 214"/>
         <p:cNvGrpSpPr/>
         <p:nvPr/>
       </p:nvGrpSpPr>
@@ -2216,7 +2216,7 @@
       </p:grpSpPr>
       <p:sp>
         <p:nvSpPr>
-          <p:cNvPr id="216" name="Google Shape;216;g302e0d3426f_1_172:notes"/>
+          <p:cNvPr id="215" name="Google Shape;215;g302e0d3426f_1_172:notes"/>
           <p:cNvSpPr/>
           <p:nvPr>
             <p:ph idx="2" type="sldImg"/>
@@ -2251,7 +2251,7 @@
       </p:sp>
       <p:sp>
         <p:nvSpPr>
-          <p:cNvPr id="217" name="Google Shape;217;g302e0d3426f_1_172:notes"/>
+          <p:cNvPr id="216" name="Google Shape;216;g302e0d3426f_1_172:notes"/>
           <p:cNvSpPr txBox="1"/>
           <p:nvPr>
             <p:ph idx="1" type="body"/>
@@ -2301,7 +2301,7 @@
   <p:cSld>
     <p:spTree>
       <p:nvGrpSpPr>
-        <p:cNvPr id="224" name="Shape 224"/>
+        <p:cNvPr id="223" name="Shape 223"/>
         <p:cNvGrpSpPr/>
         <p:nvPr/>
       </p:nvGrpSpPr>
@@ -2315,7 +2315,7 @@
       </p:grpSpPr>
       <p:sp>
         <p:nvSpPr>
-          <p:cNvPr id="225" name="Google Shape;225;g302e0d3426f_1_240:notes"/>
+          <p:cNvPr id="224" name="Google Shape;224;g302e0d3426f_1_240:notes"/>
           <p:cNvSpPr/>
           <p:nvPr>
             <p:ph idx="2" type="sldImg"/>
@@ -2350,7 +2350,7 @@
       </p:sp>
       <p:sp>
         <p:nvSpPr>
-          <p:cNvPr id="226" name="Google Shape;226;g302e0d3426f_1_240:notes"/>
+          <p:cNvPr id="225" name="Google Shape;225;g302e0d3426f_1_240:notes"/>
           <p:cNvSpPr txBox="1"/>
           <p:nvPr>
             <p:ph idx="1" type="body"/>
@@ -2400,7 +2400,7 @@
   <p:cSld>
     <p:spTree>
       <p:nvGrpSpPr>
-        <p:cNvPr id="231" name="Shape 231"/>
+        <p:cNvPr id="230" name="Shape 230"/>
         <p:cNvGrpSpPr/>
         <p:nvPr/>
       </p:nvGrpSpPr>
@@ -2414,7 +2414,7 @@
       </p:grpSpPr>
       <p:sp>
         <p:nvSpPr>
-          <p:cNvPr id="232" name="Google Shape;232;g302e0d3426f_1_245:notes"/>
+          <p:cNvPr id="231" name="Google Shape;231;g302e0d3426f_1_245:notes"/>
           <p:cNvSpPr/>
           <p:nvPr>
             <p:ph idx="2" type="sldImg"/>
@@ -2449,7 +2449,7 @@
       </p:sp>
       <p:sp>
         <p:nvSpPr>
-          <p:cNvPr id="233" name="Google Shape;233;g302e0d3426f_1_245:notes"/>
+          <p:cNvPr id="232" name="Google Shape;232;g302e0d3426f_1_245:notes"/>
           <p:cNvSpPr txBox="1"/>
           <p:nvPr>
             <p:ph idx="1" type="body"/>
@@ -2499,7 +2499,7 @@
   <p:cSld>
     <p:spTree>
       <p:nvGrpSpPr>
-        <p:cNvPr id="238" name="Shape 238"/>
+        <p:cNvPr id="237" name="Shape 237"/>
         <p:cNvGrpSpPr/>
         <p:nvPr/>
       </p:nvGrpSpPr>
@@ -2513,7 +2513,7 @@
       </p:grpSpPr>
       <p:sp>
         <p:nvSpPr>
-          <p:cNvPr id="239" name="Google Shape;239;g302e0d3426f_1_251:notes"/>
+          <p:cNvPr id="238" name="Google Shape;238;g302e0d3426f_1_251:notes"/>
           <p:cNvSpPr/>
           <p:nvPr>
             <p:ph idx="2" type="sldImg"/>
@@ -2548,7 +2548,7 @@
       </p:sp>
       <p:sp>
         <p:nvSpPr>
-          <p:cNvPr id="240" name="Google Shape;240;g302e0d3426f_1_251:notes"/>
+          <p:cNvPr id="239" name="Google Shape;239;g302e0d3426f_1_251:notes"/>
           <p:cNvSpPr txBox="1"/>
           <p:nvPr>
             <p:ph idx="1" type="body"/>
@@ -2598,7 +2598,7 @@
   <p:cSld>
     <p:spTree>
       <p:nvGrpSpPr>
-        <p:cNvPr id="246" name="Shape 246"/>
+        <p:cNvPr id="245" name="Shape 245"/>
         <p:cNvGrpSpPr/>
         <p:nvPr/>
       </p:nvGrpSpPr>
@@ -2612,7 +2612,7 @@
       </p:grpSpPr>
       <p:sp>
         <p:nvSpPr>
-          <p:cNvPr id="247" name="Google Shape;247;g302e0d3426f_1_257:notes"/>
+          <p:cNvPr id="246" name="Google Shape;246;g302e0d3426f_1_257:notes"/>
           <p:cNvSpPr/>
           <p:nvPr>
             <p:ph idx="2" type="sldImg"/>
@@ -2647,7 +2647,7 @@
       </p:sp>
       <p:sp>
         <p:nvSpPr>
-          <p:cNvPr id="248" name="Google Shape;248;g302e0d3426f_1_257:notes"/>
+          <p:cNvPr id="247" name="Google Shape;247;g302e0d3426f_1_257:notes"/>
           <p:cNvSpPr txBox="1"/>
           <p:nvPr>
             <p:ph idx="1" type="body"/>
@@ -2697,7 +2697,7 @@
   <p:cSld>
     <p:spTree>
       <p:nvGrpSpPr>
-        <p:cNvPr id="68" name="Shape 68"/>
+        <p:cNvPr id="67" name="Shape 67"/>
         <p:cNvGrpSpPr/>
         <p:nvPr/>
       </p:nvGrpSpPr>
@@ -2711,7 +2711,7 @@
       </p:grpSpPr>
       <p:sp>
         <p:nvSpPr>
-          <p:cNvPr id="69" name="Google Shape;69;g303c94392f2_0_0:notes"/>
+          <p:cNvPr id="68" name="Google Shape;68;g303c94392f2_0_0:notes"/>
           <p:cNvSpPr/>
           <p:nvPr>
             <p:ph idx="2" type="sldImg"/>
@@ -2746,7 +2746,7 @@
       </p:sp>
       <p:sp>
         <p:nvSpPr>
-          <p:cNvPr id="70" name="Google Shape;70;g303c94392f2_0_0:notes"/>
+          <p:cNvPr id="69" name="Google Shape;69;g303c94392f2_0_0:notes"/>
           <p:cNvSpPr txBox="1"/>
           <p:nvPr>
             <p:ph idx="1" type="body"/>
@@ -2796,7 +2796,7 @@
   <p:cSld>
     <p:spTree>
       <p:nvGrpSpPr>
-        <p:cNvPr id="75" name="Shape 75"/>
+        <p:cNvPr id="74" name="Shape 74"/>
         <p:cNvGrpSpPr/>
         <p:nvPr/>
       </p:nvGrpSpPr>
@@ -2810,7 +2810,7 @@
       </p:grpSpPr>
       <p:sp>
         <p:nvSpPr>
-          <p:cNvPr id="76" name="Google Shape;76;g302e0d3426f_1_130:notes"/>
+          <p:cNvPr id="75" name="Google Shape;75;g302e0d3426f_1_130:notes"/>
           <p:cNvSpPr/>
           <p:nvPr>
             <p:ph idx="2" type="sldImg"/>
@@ -2845,7 +2845,7 @@
       </p:sp>
       <p:sp>
         <p:nvSpPr>
-          <p:cNvPr id="77" name="Google Shape;77;g302e0d3426f_1_130:notes"/>
+          <p:cNvPr id="76" name="Google Shape;76;g302e0d3426f_1_130:notes"/>
           <p:cNvSpPr txBox="1"/>
           <p:nvPr>
             <p:ph idx="1" type="body"/>
@@ -2895,7 +2895,7 @@
   <p:cSld>
     <p:spTree>
       <p:nvGrpSpPr>
-        <p:cNvPr id="82" name="Shape 82"/>
+        <p:cNvPr id="81" name="Shape 81"/>
         <p:cNvGrpSpPr/>
         <p:nvPr/>
       </p:nvGrpSpPr>
@@ -2909,7 +2909,7 @@
       </p:grpSpPr>
       <p:sp>
         <p:nvSpPr>
-          <p:cNvPr id="83" name="Google Shape;83;g303bf7eac59_0_5:notes"/>
+          <p:cNvPr id="82" name="Google Shape;82;g303bf7eac59_0_5:notes"/>
           <p:cNvSpPr/>
           <p:nvPr>
             <p:ph idx="2" type="sldImg"/>
@@ -2944,7 +2944,7 @@
       </p:sp>
       <p:sp>
         <p:nvSpPr>
-          <p:cNvPr id="84" name="Google Shape;84;g303bf7eac59_0_5:notes"/>
+          <p:cNvPr id="83" name="Google Shape;83;g303bf7eac59_0_5:notes"/>
           <p:cNvSpPr txBox="1"/>
           <p:nvPr>
             <p:ph idx="1" type="body"/>
@@ -2994,7 +2994,7 @@
   <p:cSld>
     <p:spTree>
       <p:nvGrpSpPr>
-        <p:cNvPr id="90" name="Shape 90"/>
+        <p:cNvPr id="89" name="Shape 89"/>
         <p:cNvGrpSpPr/>
         <p:nvPr/>
       </p:nvGrpSpPr>
@@ -3008,7 +3008,7 @@
       </p:grpSpPr>
       <p:sp>
         <p:nvSpPr>
-          <p:cNvPr id="91" name="Google Shape;91;g303bf7eac59_0_13:notes"/>
+          <p:cNvPr id="90" name="Google Shape;90;g303bf7eac59_0_13:notes"/>
           <p:cNvSpPr/>
           <p:nvPr>
             <p:ph idx="2" type="sldImg"/>
@@ -3043,7 +3043,7 @@
       </p:sp>
       <p:sp>
         <p:nvSpPr>
-          <p:cNvPr id="92" name="Google Shape;92;g303bf7eac59_0_13:notes"/>
+          <p:cNvPr id="91" name="Google Shape;91;g303bf7eac59_0_13:notes"/>
           <p:cNvSpPr txBox="1"/>
           <p:nvPr>
             <p:ph idx="1" type="body"/>
@@ -3093,7 +3093,7 @@
   <p:cSld>
     <p:spTree>
       <p:nvGrpSpPr>
-        <p:cNvPr id="98" name="Shape 98"/>
+        <p:cNvPr id="97" name="Shape 97"/>
         <p:cNvGrpSpPr/>
         <p:nvPr/>
       </p:nvGrpSpPr>
@@ -3107,7 +3107,7 @@
       </p:grpSpPr>
       <p:sp>
         <p:nvSpPr>
-          <p:cNvPr id="99" name="Google Shape;99;g303eed29452_0_5:notes"/>
+          <p:cNvPr id="98" name="Google Shape;98;g303eed29452_0_5:notes"/>
           <p:cNvSpPr/>
           <p:nvPr>
             <p:ph idx="2" type="sldImg"/>
@@ -3142,7 +3142,7 @@
       </p:sp>
       <p:sp>
         <p:nvSpPr>
-          <p:cNvPr id="100" name="Google Shape;100;g303eed29452_0_5:notes"/>
+          <p:cNvPr id="99" name="Google Shape;99;g303eed29452_0_5:notes"/>
           <p:cNvSpPr txBox="1"/>
           <p:nvPr>
             <p:ph idx="1" type="body"/>
@@ -3192,7 +3192,7 @@
   <p:cSld>
     <p:spTree>
       <p:nvGrpSpPr>
-        <p:cNvPr id="107" name="Shape 107"/>
+        <p:cNvPr id="106" name="Shape 106"/>
         <p:cNvGrpSpPr/>
         <p:nvPr/>
       </p:nvGrpSpPr>
@@ -3206,7 +3206,7 @@
       </p:grpSpPr>
       <p:sp>
         <p:nvSpPr>
-          <p:cNvPr id="108" name="Google Shape;108;g303eed29452_0_16:notes"/>
+          <p:cNvPr id="107" name="Google Shape;107;g303eed29452_0_16:notes"/>
           <p:cNvSpPr/>
           <p:nvPr>
             <p:ph idx="2" type="sldImg"/>
@@ -3241,7 +3241,7 @@
       </p:sp>
       <p:sp>
         <p:nvSpPr>
-          <p:cNvPr id="109" name="Google Shape;109;g303eed29452_0_16:notes"/>
+          <p:cNvPr id="108" name="Google Shape;108;g303eed29452_0_16:notes"/>
           <p:cNvSpPr txBox="1"/>
           <p:nvPr>
             <p:ph idx="1" type="body"/>
@@ -3291,7 +3291,7 @@
   <p:cSld>
     <p:spTree>
       <p:nvGrpSpPr>
-        <p:cNvPr id="117" name="Shape 117"/>
+        <p:cNvPr id="116" name="Shape 116"/>
         <p:cNvGrpSpPr/>
         <p:nvPr/>
       </p:nvGrpSpPr>
@@ -3305,7 +3305,7 @@
       </p:grpSpPr>
       <p:sp>
         <p:nvSpPr>
-          <p:cNvPr id="118" name="Google Shape;118;g303bf7eac59_0_21:notes"/>
+          <p:cNvPr id="117" name="Google Shape;117;g303bf7eac59_0_21:notes"/>
           <p:cNvSpPr/>
           <p:nvPr>
             <p:ph idx="2" type="sldImg"/>
@@ -3340,7 +3340,7 @@
       </p:sp>
       <p:sp>
         <p:nvSpPr>
-          <p:cNvPr id="119" name="Google Shape;119;g303bf7eac59_0_21:notes"/>
+          <p:cNvPr id="118" name="Google Shape;118;g303bf7eac59_0_21:notes"/>
           <p:cNvSpPr txBox="1"/>
           <p:nvPr>
             <p:ph idx="1" type="body"/>
@@ -9059,7 +9059,7 @@
                 <a:cs typeface="Courier New"/>
                 <a:sym typeface="Courier New"/>
               </a:rPr>
-              <a:t>   &lt;script&gt;</a:t>
+              <a:t>  &lt;script&gt;</a:t>
             </a:r>
             <a:endParaRPr sz="1300">
               <a:solidFill>
@@ -9133,7 +9133,7 @@
                 <a:cs typeface="Courier New"/>
                 <a:sym typeface="Courier New"/>
               </a:rPr>
-              <a:t>        CSCI-111 Web Programming and Problem Solving</a:t>
+              <a:t>        	CSCI-111 Web Programming and Problem Solving</a:t>
             </a:r>
             <a:endParaRPr sz="1300">
               <a:solidFill>
@@ -9318,7 +9318,7 @@
                 <a:cs typeface="Courier New"/>
                 <a:sym typeface="Courier New"/>
               </a:rPr>
-              <a:t>        const instructors = ["Irina Dolzhikova", "Talgat Manglayev", "Aygerim Yessenbayeva"]</a:t>
+              <a:t>        const instructors =</a:t>
             </a:r>
             <a:endParaRPr sz="1300">
               <a:solidFill>
@@ -9355,7 +9355,7 @@
                 <a:cs typeface="Courier New"/>
                 <a:sym typeface="Courier New"/>
               </a:rPr>
-              <a:t>        console.log(instructors[session - 1])</a:t>
+              <a:t>                {</a:t>
             </a:r>
             <a:endParaRPr sz="1300">
               <a:solidFill>
@@ -9392,7 +9392,7 @@
                 <a:cs typeface="Courier New"/>
                 <a:sym typeface="Courier New"/>
               </a:rPr>
-              <a:t>        }</a:t>
+              <a:t>                    section_1: "Dr. Irina Dolzhikova",</a:t>
             </a:r>
             <a:endParaRPr sz="1300">
               <a:solidFill>
@@ -9429,7 +9429,31 @@
                 <a:cs typeface="Courier New"/>
                 <a:sym typeface="Courier New"/>
               </a:rPr>
-              <a:t>        </a:t>
+              <a:t>                    section_2: "</a:t>
+            </a:r>
+            <a:r>
+              <a:rPr lang="en" sz="1300">
+                <a:solidFill>
+                  <a:schemeClr val="dk1"/>
+                </a:solidFill>
+                <a:latin typeface="Courier New"/>
+                <a:ea typeface="Courier New"/>
+                <a:cs typeface="Courier New"/>
+                <a:sym typeface="Courier New"/>
+              </a:rPr>
+              <a:t>Dr. </a:t>
+            </a:r>
+            <a:r>
+              <a:rPr lang="en" sz="1300">
+                <a:solidFill>
+                  <a:schemeClr val="dk1"/>
+                </a:solidFill>
+                <a:latin typeface="Courier New"/>
+                <a:ea typeface="Courier New"/>
+                <a:cs typeface="Courier New"/>
+                <a:sym typeface="Courier New"/>
+              </a:rPr>
+              <a:t>Talgat Manglayev",</a:t>
             </a:r>
             <a:endParaRPr sz="1300">
               <a:solidFill>
@@ -9466,7 +9490,31 @@
                 <a:cs typeface="Courier New"/>
                 <a:sym typeface="Courier New"/>
               </a:rPr>
-              <a:t>        </a:t>
+              <a:t>                    section_3: "</a:t>
+            </a:r>
+            <a:r>
+              <a:rPr lang="en" sz="1300">
+                <a:solidFill>
+                  <a:schemeClr val="dk1"/>
+                </a:solidFill>
+                <a:latin typeface="Courier New"/>
+                <a:ea typeface="Courier New"/>
+                <a:cs typeface="Courier New"/>
+                <a:sym typeface="Courier New"/>
+              </a:rPr>
+              <a:t>Dr. </a:t>
+            </a:r>
+            <a:r>
+              <a:rPr lang="en" sz="1300">
+                <a:solidFill>
+                  <a:schemeClr val="dk1"/>
+                </a:solidFill>
+                <a:latin typeface="Courier New"/>
+                <a:ea typeface="Courier New"/>
+                <a:cs typeface="Courier New"/>
+                <a:sym typeface="Courier New"/>
+              </a:rPr>
+              <a:t>Syed Muhammad Umair Arif"</a:t>
             </a:r>
             <a:endParaRPr sz="1300">
               <a:solidFill>
@@ -9503,7 +9551,7 @@
                 <a:cs typeface="Courier New"/>
                 <a:sym typeface="Courier New"/>
               </a:rPr>
-              <a:t>        week_7_lecture(2)</a:t>
+              <a:t>                }</a:t>
             </a:r>
             <a:endParaRPr sz="1300">
               <a:solidFill>
@@ -9540,7 +9588,118 @@
                 <a:cs typeface="Courier New"/>
                 <a:sym typeface="Courier New"/>
               </a:rPr>
-              <a:t>        </a:t>
+              <a:t>        console.log(instructors[session])</a:t>
+            </a:r>
+            <a:endParaRPr sz="1300">
+              <a:solidFill>
+                <a:schemeClr val="dk1"/>
+              </a:solidFill>
+              <a:latin typeface="Courier New"/>
+              <a:ea typeface="Courier New"/>
+              <a:cs typeface="Courier New"/>
+              <a:sym typeface="Courier New"/>
+            </a:endParaRPr>
+          </a:p>
+          <a:p>
+            <a:pPr indent="0" lvl="0" marL="0" rtl="0" algn="l">
+              <a:spcBef>
+                <a:spcPts val="0"/>
+              </a:spcBef>
+              <a:spcAft>
+                <a:spcPts val="0"/>
+              </a:spcAft>
+              <a:buClr>
+                <a:schemeClr val="dk1"/>
+              </a:buClr>
+              <a:buSzPts val="1100"/>
+              <a:buFont typeface="Arial"/>
+              <a:buNone/>
+            </a:pPr>
+            <a:r>
+              <a:rPr lang="en" sz="1300">
+                <a:solidFill>
+                  <a:schemeClr val="dk1"/>
+                </a:solidFill>
+                <a:latin typeface="Courier New"/>
+                <a:ea typeface="Courier New"/>
+                <a:cs typeface="Courier New"/>
+                <a:sym typeface="Courier New"/>
+              </a:rPr>
+              <a:t>        }</a:t>
+            </a:r>
+            <a:endParaRPr sz="1300">
+              <a:solidFill>
+                <a:schemeClr val="dk1"/>
+              </a:solidFill>
+              <a:latin typeface="Courier New"/>
+              <a:ea typeface="Courier New"/>
+              <a:cs typeface="Courier New"/>
+              <a:sym typeface="Courier New"/>
+            </a:endParaRPr>
+          </a:p>
+          <a:p>
+            <a:pPr indent="0" lvl="0" marL="0" rtl="0" algn="l">
+              <a:spcBef>
+                <a:spcPts val="0"/>
+              </a:spcBef>
+              <a:spcAft>
+                <a:spcPts val="0"/>
+              </a:spcAft>
+              <a:buClr>
+                <a:schemeClr val="dk1"/>
+              </a:buClr>
+              <a:buSzPts val="1100"/>
+              <a:buFont typeface="Arial"/>
+              <a:buNone/>
+            </a:pPr>
+            <a:r>
+              <a:rPr lang="en" sz="1300">
+                <a:solidFill>
+                  <a:schemeClr val="dk1"/>
+                </a:solidFill>
+                <a:latin typeface="Courier New"/>
+                <a:ea typeface="Courier New"/>
+                <a:cs typeface="Courier New"/>
+                <a:sym typeface="Courier New"/>
+              </a:rPr>
+              <a:t>                        </a:t>
+            </a:r>
+            <a:endParaRPr sz="1300">
+              <a:solidFill>
+                <a:schemeClr val="dk1"/>
+              </a:solidFill>
+              <a:latin typeface="Courier New"/>
+              <a:ea typeface="Courier New"/>
+              <a:cs typeface="Courier New"/>
+              <a:sym typeface="Courier New"/>
+            </a:endParaRPr>
+          </a:p>
+          <a:p>
+            <a:pPr indent="0" lvl="0" marL="0" rtl="0" algn="l">
+              <a:spcBef>
+                <a:spcPts val="0"/>
+              </a:spcBef>
+              <a:spcAft>
+                <a:spcPts val="0"/>
+              </a:spcAft>
+              <a:buClr>
+                <a:schemeClr val="dk1"/>
+              </a:buClr>
+              <a:buSzPts val="1100"/>
+              <a:buFont typeface="Arial"/>
+              <a:buNone/>
+            </a:pPr>
+            <a:r>
+              <a:rPr lang="en" sz="1300">
+                <a:solidFill>
+                  <a:schemeClr val="dk1"/>
+                </a:solidFill>
+                <a:latin typeface="Courier New"/>
+                <a:ea typeface="Courier New"/>
+                <a:cs typeface="Courier New"/>
+                <a:sym typeface="Courier New"/>
+              </a:rPr>
+              <a:t>        week_7_lecture("section_2")</a:t>
             </a:r>
             <a:endParaRPr sz="1300">
               <a:solidFill>
@@ -9604,7 +9763,7 @@
   <p:cSld>
     <p:spTree>
       <p:nvGrpSpPr>
-        <p:cNvPr id="128" name="Shape 128"/>
+        <p:cNvPr id="127" name="Shape 127"/>
         <p:cNvGrpSpPr/>
         <p:nvPr/>
       </p:nvGrpSpPr>
@@ -9618,7 +9777,7 @@
       </p:grpSpPr>
       <p:sp>
         <p:nvSpPr>
-          <p:cNvPr id="129" name="Google Shape;129;p23"/>
+          <p:cNvPr id="128" name="Google Shape;128;p23"/>
           <p:cNvSpPr txBox="1"/>
           <p:nvPr>
             <p:ph type="title"/>
@@ -9669,7 +9828,7 @@
       </p:sp>
       <p:sp>
         <p:nvSpPr>
-          <p:cNvPr id="130" name="Google Shape;130;p23"/>
+          <p:cNvPr id="129" name="Google Shape;129;p23"/>
           <p:cNvSpPr txBox="1"/>
           <p:nvPr/>
         </p:nvSpPr>
@@ -9721,7 +9880,7 @@
       </p:sp>
       <p:sp>
         <p:nvSpPr>
-          <p:cNvPr id="131" name="Google Shape;131;p23"/>
+          <p:cNvPr id="130" name="Google Shape;130;p23"/>
           <p:cNvSpPr/>
           <p:nvPr/>
         </p:nvSpPr>
@@ -10012,7 +10171,7 @@
       </p:sp>
       <p:sp>
         <p:nvSpPr>
-          <p:cNvPr id="132" name="Google Shape;132;p23"/>
+          <p:cNvPr id="131" name="Google Shape;131;p23"/>
           <p:cNvSpPr/>
           <p:nvPr/>
         </p:nvSpPr>
@@ -10246,7 +10405,7 @@
   <p:cSld>
     <p:spTree>
       <p:nvGrpSpPr>
-        <p:cNvPr id="136" name="Shape 136"/>
+        <p:cNvPr id="135" name="Shape 135"/>
         <p:cNvGrpSpPr/>
         <p:nvPr/>
       </p:nvGrpSpPr>
@@ -10260,7 +10419,7 @@
       </p:grpSpPr>
       <p:sp>
         <p:nvSpPr>
-          <p:cNvPr id="137" name="Google Shape;137;p24"/>
+          <p:cNvPr id="136" name="Google Shape;136;p24"/>
           <p:cNvSpPr txBox="1"/>
           <p:nvPr>
             <p:ph type="title"/>
@@ -10311,7 +10470,7 @@
       </p:sp>
       <p:sp>
         <p:nvSpPr>
-          <p:cNvPr id="138" name="Google Shape;138;p24"/>
+          <p:cNvPr id="137" name="Google Shape;137;p24"/>
           <p:cNvSpPr txBox="1"/>
           <p:nvPr/>
         </p:nvSpPr>
@@ -10363,7 +10522,7 @@
       </p:sp>
       <p:sp>
         <p:nvSpPr>
-          <p:cNvPr id="139" name="Google Shape;139;p24"/>
+          <p:cNvPr id="138" name="Google Shape;138;p24"/>
           <p:cNvSpPr/>
           <p:nvPr/>
         </p:nvSpPr>
@@ -10773,7 +10932,7 @@
   <p:cSld>
     <p:spTree>
       <p:nvGrpSpPr>
-        <p:cNvPr id="143" name="Shape 143"/>
+        <p:cNvPr id="142" name="Shape 142"/>
         <p:cNvGrpSpPr/>
         <p:nvPr/>
       </p:nvGrpSpPr>
@@ -10787,7 +10946,7 @@
       </p:grpSpPr>
       <p:graphicFrame>
         <p:nvGraphicFramePr>
-          <p:cNvPr id="144" name="Google Shape;144;p25"/>
+          <p:cNvPr id="143" name="Google Shape;143;p25"/>
           <p:cNvGraphicFramePr/>
           <p:nvPr/>
         </p:nvGraphicFramePr>
@@ -10800,7 +10959,7 @@
             <a:tbl>
               <a:tblPr>
                 <a:noFill/>
-                <a:tableStyleId>{25582E17-411C-45B6-93AF-B3BD47618EEA}</a:tableStyleId>
+                <a:tableStyleId>{7E6412BE-6277-4D3E-B13E-E2AD28425036}</a:tableStyleId>
               </a:tblPr>
               <a:tblGrid>
                 <a:gridCol w="4572000"/>
@@ -11052,7 +11211,7 @@
       </p:graphicFrame>
       <p:sp>
         <p:nvSpPr>
-          <p:cNvPr id="145" name="Google Shape;145;p25"/>
+          <p:cNvPr id="144" name="Google Shape;144;p25"/>
           <p:cNvSpPr txBox="1"/>
           <p:nvPr>
             <p:ph type="title"/>
@@ -11103,7 +11262,7 @@
       </p:sp>
       <p:sp>
         <p:nvSpPr>
-          <p:cNvPr id="146" name="Google Shape;146;p25"/>
+          <p:cNvPr id="145" name="Google Shape;145;p25"/>
           <p:cNvSpPr txBox="1"/>
           <p:nvPr/>
         </p:nvSpPr>
@@ -11187,7 +11346,7 @@
   <p:cSld>
     <p:spTree>
       <p:nvGrpSpPr>
-        <p:cNvPr id="150" name="Shape 150"/>
+        <p:cNvPr id="149" name="Shape 149"/>
         <p:cNvGrpSpPr/>
         <p:nvPr/>
       </p:nvGrpSpPr>
@@ -11201,7 +11360,7 @@
       </p:grpSpPr>
       <p:sp>
         <p:nvSpPr>
-          <p:cNvPr id="151" name="Google Shape;151;p26"/>
+          <p:cNvPr id="150" name="Google Shape;150;p26"/>
           <p:cNvSpPr txBox="1"/>
           <p:nvPr>
             <p:ph idx="1" type="body"/>
@@ -11331,7 +11490,7 @@
       </p:sp>
       <p:pic>
         <p:nvPicPr>
-          <p:cNvPr id="152" name="Google Shape;152;p26"/>
+          <p:cNvPr id="151" name="Google Shape;151;p26"/>
           <p:cNvPicPr preferRelativeResize="0"/>
           <p:nvPr/>
         </p:nvPicPr>
@@ -11359,7 +11518,7 @@
       </p:pic>
       <p:pic>
         <p:nvPicPr>
-          <p:cNvPr id="153" name="Google Shape;153;p26"/>
+          <p:cNvPr id="152" name="Google Shape;152;p26"/>
           <p:cNvPicPr preferRelativeResize="0"/>
           <p:nvPr/>
         </p:nvPicPr>
@@ -11387,7 +11546,7 @@
       </p:pic>
       <p:sp>
         <p:nvSpPr>
-          <p:cNvPr id="154" name="Google Shape;154;p26"/>
+          <p:cNvPr id="153" name="Google Shape;153;p26"/>
           <p:cNvSpPr txBox="1"/>
           <p:nvPr>
             <p:ph type="title"/>
@@ -11449,7 +11608,7 @@
   <p:cSld>
     <p:spTree>
       <p:nvGrpSpPr>
-        <p:cNvPr id="158" name="Shape 158"/>
+        <p:cNvPr id="157" name="Shape 157"/>
         <p:cNvGrpSpPr/>
         <p:nvPr/>
       </p:nvGrpSpPr>
@@ -11463,7 +11622,7 @@
       </p:grpSpPr>
       <p:sp>
         <p:nvSpPr>
-          <p:cNvPr id="159" name="Google Shape;159;p27"/>
+          <p:cNvPr id="158" name="Google Shape;158;p27"/>
           <p:cNvSpPr txBox="1"/>
           <p:nvPr>
             <p:ph type="title"/>
@@ -11514,7 +11673,7 @@
       </p:sp>
       <p:pic>
         <p:nvPicPr>
-          <p:cNvPr id="160" name="Google Shape;160;p27"/>
+          <p:cNvPr id="159" name="Google Shape;159;p27"/>
           <p:cNvPicPr preferRelativeResize="0"/>
           <p:nvPr/>
         </p:nvPicPr>
@@ -11541,7 +11700,7 @@
       </p:pic>
       <p:sp>
         <p:nvSpPr>
-          <p:cNvPr id="161" name="Google Shape;161;p27"/>
+          <p:cNvPr id="160" name="Google Shape;160;p27"/>
           <p:cNvSpPr txBox="1"/>
           <p:nvPr/>
         </p:nvSpPr>
@@ -11625,7 +11784,7 @@
   <p:cSld>
     <p:spTree>
       <p:nvGrpSpPr>
-        <p:cNvPr id="165" name="Shape 165"/>
+        <p:cNvPr id="164" name="Shape 164"/>
         <p:cNvGrpSpPr/>
         <p:nvPr/>
       </p:nvGrpSpPr>
@@ -11639,7 +11798,7 @@
       </p:grpSpPr>
       <p:sp>
         <p:nvSpPr>
-          <p:cNvPr id="166" name="Google Shape;166;p28"/>
+          <p:cNvPr id="165" name="Google Shape;165;p28"/>
           <p:cNvSpPr txBox="1"/>
           <p:nvPr>
             <p:ph type="title"/>
@@ -11690,7 +11849,7 @@
       </p:sp>
       <p:sp>
         <p:nvSpPr>
-          <p:cNvPr id="167" name="Google Shape;167;p28"/>
+          <p:cNvPr id="166" name="Google Shape;166;p28"/>
           <p:cNvSpPr txBox="1"/>
           <p:nvPr/>
         </p:nvSpPr>
@@ -11751,7 +11910,7 @@
       </p:sp>
       <p:pic>
         <p:nvPicPr>
-          <p:cNvPr id="168" name="Google Shape;168;p28"/>
+          <p:cNvPr id="167" name="Google Shape;167;p28"/>
           <p:cNvPicPr preferRelativeResize="0"/>
           <p:nvPr/>
         </p:nvPicPr>
@@ -11789,7 +11948,7 @@
   <p:cSld>
     <p:spTree>
       <p:nvGrpSpPr>
-        <p:cNvPr id="172" name="Shape 172"/>
+        <p:cNvPr id="171" name="Shape 171"/>
         <p:cNvGrpSpPr/>
         <p:nvPr/>
       </p:nvGrpSpPr>
@@ -11803,7 +11962,7 @@
       </p:grpSpPr>
       <p:sp>
         <p:nvSpPr>
-          <p:cNvPr id="173" name="Google Shape;173;p29"/>
+          <p:cNvPr id="172" name="Google Shape;172;p29"/>
           <p:cNvSpPr txBox="1"/>
           <p:nvPr>
             <p:ph idx="1" type="body"/>
@@ -12202,7 +12361,7 @@
       </p:sp>
       <p:sp>
         <p:nvSpPr>
-          <p:cNvPr id="174" name="Google Shape;174;p29"/>
+          <p:cNvPr id="173" name="Google Shape;173;p29"/>
           <p:cNvSpPr txBox="1"/>
           <p:nvPr>
             <p:ph type="title"/>
@@ -12264,7 +12423,7 @@
   <p:cSld>
     <p:spTree>
       <p:nvGrpSpPr>
-        <p:cNvPr id="178" name="Shape 178"/>
+        <p:cNvPr id="177" name="Shape 177"/>
         <p:cNvGrpSpPr/>
         <p:nvPr/>
       </p:nvGrpSpPr>
@@ -12278,7 +12437,7 @@
       </p:grpSpPr>
       <p:sp>
         <p:nvSpPr>
-          <p:cNvPr id="179" name="Google Shape;179;p30"/>
+          <p:cNvPr id="178" name="Google Shape;178;p30"/>
           <p:cNvSpPr txBox="1"/>
           <p:nvPr>
             <p:ph idx="1" type="body"/>
@@ -12459,7 +12618,7 @@
       </p:sp>
       <p:sp>
         <p:nvSpPr>
-          <p:cNvPr id="180" name="Google Shape;180;p30"/>
+          <p:cNvPr id="179" name="Google Shape;179;p30"/>
           <p:cNvSpPr txBox="1"/>
           <p:nvPr>
             <p:ph type="title"/>
@@ -12521,7 +12680,7 @@
   <p:cSld>
     <p:spTree>
       <p:nvGrpSpPr>
-        <p:cNvPr id="184" name="Shape 184"/>
+        <p:cNvPr id="183" name="Shape 183"/>
         <p:cNvGrpSpPr/>
         <p:nvPr/>
       </p:nvGrpSpPr>
@@ -12535,7 +12694,7 @@
       </p:grpSpPr>
       <p:sp>
         <p:nvSpPr>
-          <p:cNvPr id="185" name="Google Shape;185;p31"/>
+          <p:cNvPr id="184" name="Google Shape;184;p31"/>
           <p:cNvSpPr txBox="1"/>
           <p:nvPr>
             <p:ph type="title"/>
@@ -12585,7 +12744,7 @@
       </p:sp>
       <p:sp>
         <p:nvSpPr>
-          <p:cNvPr id="186" name="Google Shape;186;p31"/>
+          <p:cNvPr id="185" name="Google Shape;185;p31"/>
           <p:cNvSpPr txBox="1"/>
           <p:nvPr>
             <p:ph idx="1" type="body"/>
@@ -12737,7 +12896,7 @@
       </p:sp>
       <p:sp>
         <p:nvSpPr>
-          <p:cNvPr id="187" name="Google Shape;187;p31"/>
+          <p:cNvPr id="186" name="Google Shape;186;p31"/>
           <p:cNvSpPr txBox="1"/>
           <p:nvPr/>
         </p:nvSpPr>
@@ -12821,7 +12980,7 @@
   <p:cSld>
     <p:spTree>
       <p:nvGrpSpPr>
-        <p:cNvPr id="191" name="Shape 191"/>
+        <p:cNvPr id="190" name="Shape 190"/>
         <p:cNvGrpSpPr/>
         <p:nvPr/>
       </p:nvGrpSpPr>
@@ -12835,7 +12994,7 @@
       </p:grpSpPr>
       <p:sp>
         <p:nvSpPr>
-          <p:cNvPr id="192" name="Google Shape;192;p32"/>
+          <p:cNvPr id="191" name="Google Shape;191;p32"/>
           <p:cNvSpPr txBox="1"/>
           <p:nvPr>
             <p:ph type="title"/>
@@ -12885,7 +13044,7 @@
       </p:sp>
       <p:sp>
         <p:nvSpPr>
-          <p:cNvPr id="193" name="Google Shape;193;p32"/>
+          <p:cNvPr id="192" name="Google Shape;192;p32"/>
           <p:cNvSpPr txBox="1"/>
           <p:nvPr>
             <p:ph idx="1" type="body"/>
@@ -13234,6 +13393,529 @@
       <p:sp>
         <p:nvSpPr>
           <p:cNvPr id="66" name="Google Shape;66;p15"/>
+          <p:cNvSpPr/>
+          <p:nvPr/>
+        </p:nvSpPr>
+        <p:spPr>
+          <a:xfrm>
+            <a:off x="0" y="572700"/>
+            <a:ext cx="9144000" cy="4194900"/>
+          </a:xfrm>
+          <a:prstGeom prst="rect">
+            <a:avLst/>
+          </a:prstGeom>
+          <a:noFill/>
+          <a:ln>
+            <a:noFill/>
+          </a:ln>
+        </p:spPr>
+        <p:txBody>
+          <a:bodyPr anchorCtr="0" anchor="ctr" bIns="91425" lIns="91425" spcFirstLastPara="1" rIns="91425" wrap="square" tIns="91425">
+            <a:noAutofit/>
+          </a:bodyPr>
+          <a:lstStyle/>
+          <a:p>
+            <a:pPr indent="-419100" lvl="0" marL="457200" rtl="0" algn="l">
+              <a:spcBef>
+                <a:spcPts val="185"/>
+              </a:spcBef>
+              <a:spcAft>
+                <a:spcPts val="0"/>
+              </a:spcAft>
+              <a:buClr>
+                <a:schemeClr val="dk1"/>
+              </a:buClr>
+              <a:buSzPts val="3000"/>
+              <a:buFont typeface="Times New Roman"/>
+              <a:buChar char="●"/>
+            </a:pPr>
+            <a:r>
+              <a:rPr lang="en" sz="3000">
+                <a:solidFill>
+                  <a:schemeClr val="dk1"/>
+                </a:solidFill>
+                <a:latin typeface="Times New Roman"/>
+                <a:ea typeface="Times New Roman"/>
+                <a:cs typeface="Times New Roman"/>
+                <a:sym typeface="Times New Roman"/>
+              </a:rPr>
+              <a:t>Comparison</a:t>
+            </a:r>
+            <a:endParaRPr sz="3000">
+              <a:solidFill>
+                <a:schemeClr val="dk1"/>
+              </a:solidFill>
+              <a:latin typeface="Times New Roman"/>
+              <a:ea typeface="Times New Roman"/>
+              <a:cs typeface="Times New Roman"/>
+              <a:sym typeface="Times New Roman"/>
+            </a:endParaRPr>
+          </a:p>
+          <a:p>
+            <a:pPr indent="-419100" lvl="0" marL="457200" rtl="0" algn="l">
+              <a:spcBef>
+                <a:spcPts val="0"/>
+              </a:spcBef>
+              <a:spcAft>
+                <a:spcPts val="0"/>
+              </a:spcAft>
+              <a:buClr>
+                <a:schemeClr val="dk1"/>
+              </a:buClr>
+              <a:buSzPts val="3000"/>
+              <a:buFont typeface="Times New Roman"/>
+              <a:buChar char="●"/>
+            </a:pPr>
+            <a:r>
+              <a:rPr lang="en" sz="3000">
+                <a:solidFill>
+                  <a:schemeClr val="dk1"/>
+                </a:solidFill>
+                <a:latin typeface="Times New Roman"/>
+                <a:ea typeface="Times New Roman"/>
+                <a:cs typeface="Times New Roman"/>
+                <a:sym typeface="Times New Roman"/>
+              </a:rPr>
+              <a:t>Logical operators</a:t>
+            </a:r>
+            <a:endParaRPr sz="3000">
+              <a:solidFill>
+                <a:schemeClr val="dk1"/>
+              </a:solidFill>
+              <a:latin typeface="Times New Roman"/>
+              <a:ea typeface="Times New Roman"/>
+              <a:cs typeface="Times New Roman"/>
+              <a:sym typeface="Times New Roman"/>
+            </a:endParaRPr>
+          </a:p>
+          <a:p>
+            <a:pPr indent="-419100" lvl="0" marL="457200" rtl="0" algn="l">
+              <a:spcBef>
+                <a:spcPts val="0"/>
+              </a:spcBef>
+              <a:spcAft>
+                <a:spcPts val="0"/>
+              </a:spcAft>
+              <a:buClr>
+                <a:schemeClr val="dk1"/>
+              </a:buClr>
+              <a:buSzPts val="3000"/>
+              <a:buFont typeface="Times New Roman"/>
+              <a:buChar char="●"/>
+            </a:pPr>
+            <a:r>
+              <a:rPr lang="en" sz="3000">
+                <a:solidFill>
+                  <a:schemeClr val="dk1"/>
+                </a:solidFill>
+                <a:latin typeface="Times New Roman"/>
+                <a:ea typeface="Times New Roman"/>
+                <a:cs typeface="Times New Roman"/>
+                <a:sym typeface="Times New Roman"/>
+              </a:rPr>
+              <a:t>Functions</a:t>
+            </a:r>
+            <a:endParaRPr sz="3000">
+              <a:solidFill>
+                <a:schemeClr val="dk1"/>
+              </a:solidFill>
+              <a:latin typeface="Times New Roman"/>
+              <a:ea typeface="Times New Roman"/>
+              <a:cs typeface="Times New Roman"/>
+              <a:sym typeface="Times New Roman"/>
+            </a:endParaRPr>
+          </a:p>
+          <a:p>
+            <a:pPr indent="-355600" lvl="1" marL="914400" rtl="0" algn="l">
+              <a:spcBef>
+                <a:spcPts val="0"/>
+              </a:spcBef>
+              <a:spcAft>
+                <a:spcPts val="0"/>
+              </a:spcAft>
+              <a:buClr>
+                <a:schemeClr val="dk1"/>
+              </a:buClr>
+              <a:buSzPts val="2000"/>
+              <a:buFont typeface="Times New Roman"/>
+              <a:buChar char="○"/>
+            </a:pPr>
+            <a:r>
+              <a:rPr lang="en" sz="2000">
+                <a:solidFill>
+                  <a:schemeClr val="dk1"/>
+                </a:solidFill>
+                <a:latin typeface="Times New Roman"/>
+                <a:ea typeface="Times New Roman"/>
+                <a:cs typeface="Times New Roman"/>
+                <a:sym typeface="Times New Roman"/>
+              </a:rPr>
+              <a:t>Function declaration and call</a:t>
+            </a:r>
+            <a:endParaRPr sz="2000">
+              <a:solidFill>
+                <a:schemeClr val="dk1"/>
+              </a:solidFill>
+              <a:latin typeface="Times New Roman"/>
+              <a:ea typeface="Times New Roman"/>
+              <a:cs typeface="Times New Roman"/>
+              <a:sym typeface="Times New Roman"/>
+            </a:endParaRPr>
+          </a:p>
+          <a:p>
+            <a:pPr indent="-355600" lvl="1" marL="914400" rtl="0" algn="l">
+              <a:spcBef>
+                <a:spcPts val="0"/>
+              </a:spcBef>
+              <a:spcAft>
+                <a:spcPts val="0"/>
+              </a:spcAft>
+              <a:buClr>
+                <a:schemeClr val="dk1"/>
+              </a:buClr>
+              <a:buSzPts val="2000"/>
+              <a:buFont typeface="Times New Roman"/>
+              <a:buChar char="○"/>
+            </a:pPr>
+            <a:r>
+              <a:rPr lang="en" sz="2000">
+                <a:solidFill>
+                  <a:schemeClr val="dk1"/>
+                </a:solidFill>
+                <a:latin typeface="Times New Roman"/>
+                <a:ea typeface="Times New Roman"/>
+                <a:cs typeface="Times New Roman"/>
+                <a:sym typeface="Times New Roman"/>
+              </a:rPr>
+              <a:t>Arguments and parameters</a:t>
+            </a:r>
+            <a:endParaRPr sz="2000">
+              <a:solidFill>
+                <a:schemeClr val="dk1"/>
+              </a:solidFill>
+              <a:latin typeface="Times New Roman"/>
+              <a:ea typeface="Times New Roman"/>
+              <a:cs typeface="Times New Roman"/>
+              <a:sym typeface="Times New Roman"/>
+            </a:endParaRPr>
+          </a:p>
+          <a:p>
+            <a:pPr indent="-355600" lvl="1" marL="914400" rtl="0" algn="l">
+              <a:spcBef>
+                <a:spcPts val="0"/>
+              </a:spcBef>
+              <a:spcAft>
+                <a:spcPts val="0"/>
+              </a:spcAft>
+              <a:buClr>
+                <a:schemeClr val="dk1"/>
+              </a:buClr>
+              <a:buSzPts val="2000"/>
+              <a:buFont typeface="Times New Roman"/>
+              <a:buChar char="○"/>
+            </a:pPr>
+            <a:r>
+              <a:rPr lang="en" sz="2000">
+                <a:solidFill>
+                  <a:schemeClr val="dk1"/>
+                </a:solidFill>
+                <a:latin typeface="Times New Roman"/>
+                <a:ea typeface="Times New Roman"/>
+                <a:cs typeface="Times New Roman"/>
+                <a:sym typeface="Times New Roman"/>
+              </a:rPr>
+              <a:t>Scope</a:t>
+            </a:r>
+            <a:endParaRPr sz="2000">
+              <a:solidFill>
+                <a:schemeClr val="dk1"/>
+              </a:solidFill>
+              <a:latin typeface="Times New Roman"/>
+              <a:ea typeface="Times New Roman"/>
+              <a:cs typeface="Times New Roman"/>
+              <a:sym typeface="Times New Roman"/>
+            </a:endParaRPr>
+          </a:p>
+          <a:p>
+            <a:pPr indent="0" lvl="0" marL="0" rtl="0" algn="r">
+              <a:spcBef>
+                <a:spcPts val="185"/>
+              </a:spcBef>
+              <a:spcAft>
+                <a:spcPts val="0"/>
+              </a:spcAft>
+              <a:buClr>
+                <a:schemeClr val="dk1"/>
+              </a:buClr>
+              <a:buSzPts val="1100"/>
+              <a:buFont typeface="Arial"/>
+              <a:buNone/>
+            </a:pPr>
+            <a:r>
+              <a:t/>
+            </a:r>
+            <a:endParaRPr sz="1800">
+              <a:solidFill>
+                <a:schemeClr val="dk1"/>
+              </a:solidFill>
+              <a:latin typeface="Times New Roman"/>
+              <a:ea typeface="Times New Roman"/>
+              <a:cs typeface="Times New Roman"/>
+              <a:sym typeface="Times New Roman"/>
+            </a:endParaRPr>
+          </a:p>
+        </p:txBody>
+      </p:sp>
+    </p:spTree>
+  </p:cSld>
+  <p:clrMapOvr>
+    <a:masterClrMapping/>
+  </p:clrMapOvr>
+</p:sld>
+</file>
+
+<file path=ppt/slides/slide20.xml><?xml version="1.0" encoding="utf-8"?>
+<p:sld xmlns:a="http://schemas.openxmlformats.org/drawingml/2006/main" xmlns:r="http://schemas.openxmlformats.org/officeDocument/2006/relationships" xmlns:mc="http://schemas.openxmlformats.org/markup-compatibility/2006" xmlns:mv="urn:schemas-microsoft-com:mac:vml" xmlns:p="http://schemas.openxmlformats.org/presentationml/2006/main" xmlns:c="http://schemas.openxmlformats.org/drawingml/2006/chart" xmlns:dgm="http://schemas.openxmlformats.org/drawingml/2006/diagram" xmlns:o="urn:schemas-microsoft-com:office:office" xmlns:v="urn:schemas-microsoft-com:vml" xmlns:pvml="urn:schemas-microsoft-com:office:powerpoint" xmlns:com="http://schemas.openxmlformats.org/drawingml/2006/compatibility" xmlns:p14="http://schemas.microsoft.com/office/powerpoint/2010/main" xmlns:p15="http://schemas.microsoft.com/office/powerpoint/2012/main" xmlns:ahyp="http://schemas.microsoft.com/office/drawing/2018/hyperlinkcolor">
+  <p:cSld>
+    <p:spTree>
+      <p:nvGrpSpPr>
+        <p:cNvPr id="196" name="Shape 196"/>
+        <p:cNvGrpSpPr/>
+        <p:nvPr/>
+      </p:nvGrpSpPr>
+      <p:grpSpPr>
+        <a:xfrm>
+          <a:off x="0" y="0"/>
+          <a:ext cx="0" cy="0"/>
+          <a:chOff x="0" y="0"/>
+          <a:chExt cx="0" cy="0"/>
+        </a:xfrm>
+      </p:grpSpPr>
+      <p:sp>
+        <p:nvSpPr>
+          <p:cNvPr id="197" name="Google Shape;197;p33"/>
+          <p:cNvSpPr txBox="1"/>
+          <p:nvPr>
+            <p:ph type="title"/>
+          </p:nvPr>
+        </p:nvSpPr>
+        <p:spPr>
+          <a:xfrm>
+            <a:off x="0" y="0"/>
+            <a:ext cx="9144000" cy="572700"/>
+          </a:xfrm>
+          <a:prstGeom prst="rect">
+            <a:avLst/>
+          </a:prstGeom>
+        </p:spPr>
+        <p:txBody>
+          <a:bodyPr anchorCtr="0" anchor="t" bIns="91425" lIns="91425" spcFirstLastPara="1" rIns="91425" wrap="square" tIns="91425">
+            <a:noAutofit/>
+          </a:bodyPr>
+          <a:lstStyle/>
+          <a:p>
+            <a:pPr indent="0" lvl="0" marL="0" rtl="0" algn="l">
+              <a:spcBef>
+                <a:spcPts val="0"/>
+              </a:spcBef>
+              <a:spcAft>
+                <a:spcPts val="0"/>
+              </a:spcAft>
+              <a:buNone/>
+            </a:pPr>
+            <a:r>
+              <a:rPr lang="en" sz="3000">
+                <a:latin typeface="Times New Roman"/>
+                <a:ea typeface="Times New Roman"/>
+                <a:cs typeface="Times New Roman"/>
+                <a:sym typeface="Times New Roman"/>
+              </a:rPr>
+              <a:t>Function declaration</a:t>
+            </a:r>
+            <a:endParaRPr sz="3000">
+              <a:latin typeface="Times New Roman"/>
+              <a:ea typeface="Times New Roman"/>
+              <a:cs typeface="Times New Roman"/>
+              <a:sym typeface="Times New Roman"/>
+            </a:endParaRPr>
+          </a:p>
+        </p:txBody>
+      </p:sp>
+      <p:sp>
+        <p:nvSpPr>
+          <p:cNvPr id="198" name="Google Shape;198;p33"/>
+          <p:cNvSpPr txBox="1"/>
+          <p:nvPr>
+            <p:ph idx="1" type="body"/>
+          </p:nvPr>
+        </p:nvSpPr>
+        <p:spPr>
+          <a:xfrm>
+            <a:off x="0" y="572700"/>
+            <a:ext cx="9144000" cy="4570800"/>
+          </a:xfrm>
+          <a:prstGeom prst="rect">
+            <a:avLst/>
+          </a:prstGeom>
+        </p:spPr>
+        <p:txBody>
+          <a:bodyPr anchorCtr="0" anchor="t" bIns="91425" lIns="91425" spcFirstLastPara="1" rIns="91425" wrap="square" tIns="91425">
+            <a:normAutofit/>
+          </a:bodyPr>
+          <a:lstStyle/>
+          <a:p>
+            <a:pPr indent="0" lvl="0" marL="0" rtl="0" algn="l">
+              <a:spcBef>
+                <a:spcPts val="0"/>
+              </a:spcBef>
+              <a:spcAft>
+                <a:spcPts val="0"/>
+              </a:spcAft>
+              <a:buClr>
+                <a:schemeClr val="dk1"/>
+              </a:buClr>
+              <a:buSzPts val="1100"/>
+              <a:buFont typeface="Arial"/>
+              <a:buNone/>
+            </a:pPr>
+            <a:r>
+              <a:rPr lang="en">
+                <a:solidFill>
+                  <a:schemeClr val="dk1"/>
+                </a:solidFill>
+                <a:latin typeface="Courier New"/>
+                <a:ea typeface="Courier New"/>
+                <a:cs typeface="Courier New"/>
+                <a:sym typeface="Courier New"/>
+              </a:rPr>
+              <a:t>const multiplyByThree = function(a)</a:t>
+            </a:r>
+            <a:endParaRPr>
+              <a:solidFill>
+                <a:schemeClr val="dk1"/>
+              </a:solidFill>
+              <a:latin typeface="Courier New"/>
+              <a:ea typeface="Courier New"/>
+              <a:cs typeface="Courier New"/>
+              <a:sym typeface="Courier New"/>
+            </a:endParaRPr>
+          </a:p>
+          <a:p>
+            <a:pPr indent="0" lvl="0" marL="0" rtl="0" algn="l">
+              <a:spcBef>
+                <a:spcPts val="1200"/>
+              </a:spcBef>
+              <a:spcAft>
+                <a:spcPts val="0"/>
+              </a:spcAft>
+              <a:buClr>
+                <a:schemeClr val="dk1"/>
+              </a:buClr>
+              <a:buSzPts val="1100"/>
+              <a:buFont typeface="Arial"/>
+              <a:buNone/>
+            </a:pPr>
+            <a:r>
+              <a:rPr lang="en">
+                <a:solidFill>
+                  <a:schemeClr val="dk1"/>
+                </a:solidFill>
+                <a:latin typeface="Courier New"/>
+                <a:ea typeface="Courier New"/>
+                <a:cs typeface="Courier New"/>
+                <a:sym typeface="Courier New"/>
+              </a:rPr>
+              <a:t>{</a:t>
+            </a:r>
+            <a:endParaRPr>
+              <a:solidFill>
+                <a:schemeClr val="dk1"/>
+              </a:solidFill>
+              <a:latin typeface="Courier New"/>
+              <a:ea typeface="Courier New"/>
+              <a:cs typeface="Courier New"/>
+              <a:sym typeface="Courier New"/>
+            </a:endParaRPr>
+          </a:p>
+          <a:p>
+            <a:pPr indent="457200" lvl="0" marL="0" rtl="0" algn="l">
+              <a:spcBef>
+                <a:spcPts val="1200"/>
+              </a:spcBef>
+              <a:spcAft>
+                <a:spcPts val="0"/>
+              </a:spcAft>
+              <a:buClr>
+                <a:schemeClr val="dk1"/>
+              </a:buClr>
+              <a:buSzPts val="1100"/>
+              <a:buFont typeface="Arial"/>
+              <a:buNone/>
+            </a:pPr>
+            <a:r>
+              <a:rPr lang="en">
+                <a:solidFill>
+                  <a:schemeClr val="dk1"/>
+                </a:solidFill>
+                <a:latin typeface="Courier New"/>
+                <a:ea typeface="Courier New"/>
+                <a:cs typeface="Courier New"/>
+                <a:sym typeface="Courier New"/>
+              </a:rPr>
+              <a:t>return a * 3;</a:t>
+            </a:r>
+            <a:endParaRPr>
+              <a:solidFill>
+                <a:schemeClr val="dk1"/>
+              </a:solidFill>
+              <a:latin typeface="Courier New"/>
+              <a:ea typeface="Courier New"/>
+              <a:cs typeface="Courier New"/>
+              <a:sym typeface="Courier New"/>
+            </a:endParaRPr>
+          </a:p>
+          <a:p>
+            <a:pPr indent="0" lvl="0" marL="0" rtl="0" algn="l">
+              <a:spcBef>
+                <a:spcPts val="1200"/>
+              </a:spcBef>
+              <a:spcAft>
+                <a:spcPts val="1200"/>
+              </a:spcAft>
+              <a:buClr>
+                <a:schemeClr val="dk1"/>
+              </a:buClr>
+              <a:buSzPts val="1100"/>
+              <a:buFont typeface="Arial"/>
+              <a:buNone/>
+            </a:pPr>
+            <a:r>
+              <a:rPr lang="en">
+                <a:solidFill>
+                  <a:schemeClr val="dk1"/>
+                </a:solidFill>
+                <a:latin typeface="Courier New"/>
+                <a:ea typeface="Courier New"/>
+                <a:cs typeface="Courier New"/>
+                <a:sym typeface="Courier New"/>
+              </a:rPr>
+              <a:t>}</a:t>
+            </a:r>
+            <a:endParaRPr>
+              <a:solidFill>
+                <a:schemeClr val="dk1"/>
+              </a:solidFill>
+              <a:latin typeface="Courier New"/>
+              <a:ea typeface="Courier New"/>
+              <a:cs typeface="Courier New"/>
+              <a:sym typeface="Courier New"/>
+            </a:endParaRPr>
+          </a:p>
+        </p:txBody>
+      </p:sp>
+      <p:sp>
+        <p:nvSpPr>
+          <p:cNvPr id="199" name="Google Shape;199;p33"/>
           <p:cNvSpPr txBox="1"/>
           <p:nvPr/>
         </p:nvSpPr>
@@ -13278,61 +13960,10 @@
                 <a:cs typeface="Times New Roman"/>
                 <a:sym typeface="Times New Roman"/>
               </a:rPr>
-              <a:t>1.html, 2.html</a:t>
-            </a:r>
-            <a:endParaRPr b="1">
-              <a:solidFill>
-                <a:schemeClr val="dk1"/>
-              </a:solidFill>
-              <a:latin typeface="Times New Roman"/>
-              <a:ea typeface="Times New Roman"/>
-              <a:cs typeface="Times New Roman"/>
-              <a:sym typeface="Times New Roman"/>
-            </a:endParaRPr>
-          </a:p>
-        </p:txBody>
-      </p:sp>
-      <p:sp>
-        <p:nvSpPr>
-          <p:cNvPr id="67" name="Google Shape;67;p15"/>
-          <p:cNvSpPr/>
-          <p:nvPr/>
-        </p:nvSpPr>
-        <p:spPr>
-          <a:xfrm>
-            <a:off x="0" y="572700"/>
-            <a:ext cx="9144000" cy="4194900"/>
-          </a:xfrm>
-          <a:prstGeom prst="rect">
-            <a:avLst/>
-          </a:prstGeom>
-          <a:noFill/>
-          <a:ln>
-            <a:noFill/>
-          </a:ln>
-        </p:spPr>
-        <p:txBody>
-          <a:bodyPr anchorCtr="0" anchor="ctr" bIns="91425" lIns="91425" spcFirstLastPara="1" rIns="91425" wrap="square" tIns="91425">
-            <a:noAutofit/>
-          </a:bodyPr>
-          <a:lstStyle/>
-          <a:p>
-            <a:pPr indent="-419100" lvl="0" marL="457200" rtl="0" algn="l">
-              <a:spcBef>
-                <a:spcPts val="185"/>
-              </a:spcBef>
-              <a:spcAft>
-                <a:spcPts val="0"/>
-              </a:spcAft>
-              <a:buClr>
-                <a:schemeClr val="dk1"/>
-              </a:buClr>
-              <a:buSzPts val="3000"/>
-              <a:buFont typeface="Times New Roman"/>
-              <a:buChar char="●"/>
-            </a:pPr>
-            <a:r>
-              <a:rPr lang="en" sz="3000">
+              <a:t>10</a:t>
+            </a:r>
+            <a:r>
+              <a:rPr b="1" lang="en">
                 <a:solidFill>
                   <a:schemeClr val="dk1"/>
                 </a:solidFill>
@@ -13341,222 +13972,9 @@
                 <a:cs typeface="Times New Roman"/>
                 <a:sym typeface="Times New Roman"/>
               </a:rPr>
-              <a:t>Comparison</a:t>
-            </a:r>
-            <a:endParaRPr sz="3000">
-              <a:solidFill>
-                <a:schemeClr val="dk1"/>
-              </a:solidFill>
-              <a:latin typeface="Times New Roman"/>
-              <a:ea typeface="Times New Roman"/>
-              <a:cs typeface="Times New Roman"/>
-              <a:sym typeface="Times New Roman"/>
-            </a:endParaRPr>
-          </a:p>
-          <a:p>
-            <a:pPr indent="-419100" lvl="0" marL="457200" rtl="0" algn="l">
-              <a:spcBef>
-                <a:spcPts val="0"/>
-              </a:spcBef>
-              <a:spcAft>
-                <a:spcPts val="0"/>
-              </a:spcAft>
-              <a:buClr>
-                <a:schemeClr val="dk1"/>
-              </a:buClr>
-              <a:buSzPts val="3000"/>
-              <a:buFont typeface="Times New Roman"/>
-              <a:buChar char="●"/>
-            </a:pPr>
-            <a:r>
-              <a:rPr lang="en" sz="3000">
-                <a:solidFill>
-                  <a:schemeClr val="dk1"/>
-                </a:solidFill>
-                <a:latin typeface="Times New Roman"/>
-                <a:ea typeface="Times New Roman"/>
-                <a:cs typeface="Times New Roman"/>
-                <a:sym typeface="Times New Roman"/>
-              </a:rPr>
-              <a:t>Logical operators</a:t>
-            </a:r>
-            <a:endParaRPr sz="3000">
-              <a:solidFill>
-                <a:schemeClr val="dk1"/>
-              </a:solidFill>
-              <a:latin typeface="Times New Roman"/>
-              <a:ea typeface="Times New Roman"/>
-              <a:cs typeface="Times New Roman"/>
-              <a:sym typeface="Times New Roman"/>
-            </a:endParaRPr>
-          </a:p>
-          <a:p>
-            <a:pPr indent="-419100" lvl="0" marL="457200" rtl="0" algn="l">
-              <a:spcBef>
-                <a:spcPts val="0"/>
-              </a:spcBef>
-              <a:spcAft>
-                <a:spcPts val="0"/>
-              </a:spcAft>
-              <a:buClr>
-                <a:schemeClr val="dk1"/>
-              </a:buClr>
-              <a:buSzPts val="3000"/>
-              <a:buFont typeface="Times New Roman"/>
-              <a:buChar char="●"/>
-            </a:pPr>
-            <a:r>
-              <a:rPr lang="en" sz="3000">
-                <a:solidFill>
-                  <a:schemeClr val="dk1"/>
-                </a:solidFill>
-                <a:latin typeface="Times New Roman"/>
-                <a:ea typeface="Times New Roman"/>
-                <a:cs typeface="Times New Roman"/>
-                <a:sym typeface="Times New Roman"/>
-              </a:rPr>
-              <a:t>Functions</a:t>
-            </a:r>
-            <a:endParaRPr sz="3000">
-              <a:solidFill>
-                <a:schemeClr val="dk1"/>
-              </a:solidFill>
-              <a:latin typeface="Times New Roman"/>
-              <a:ea typeface="Times New Roman"/>
-              <a:cs typeface="Times New Roman"/>
-              <a:sym typeface="Times New Roman"/>
-            </a:endParaRPr>
-          </a:p>
-          <a:p>
-            <a:pPr indent="-355600" lvl="1" marL="914400" rtl="0" algn="l">
-              <a:spcBef>
-                <a:spcPts val="0"/>
-              </a:spcBef>
-              <a:spcAft>
-                <a:spcPts val="0"/>
-              </a:spcAft>
-              <a:buClr>
-                <a:schemeClr val="dk1"/>
-              </a:buClr>
-              <a:buSzPts val="2000"/>
-              <a:buFont typeface="Times New Roman"/>
-              <a:buChar char="○"/>
-            </a:pPr>
-            <a:r>
-              <a:rPr lang="en" sz="2000">
-                <a:solidFill>
-                  <a:schemeClr val="dk1"/>
-                </a:solidFill>
-                <a:latin typeface="Times New Roman"/>
-                <a:ea typeface="Times New Roman"/>
-                <a:cs typeface="Times New Roman"/>
-                <a:sym typeface="Times New Roman"/>
-              </a:rPr>
-              <a:t>Function declaration and call</a:t>
-            </a:r>
-            <a:endParaRPr sz="2000">
-              <a:solidFill>
-                <a:schemeClr val="dk1"/>
-              </a:solidFill>
-              <a:latin typeface="Times New Roman"/>
-              <a:ea typeface="Times New Roman"/>
-              <a:cs typeface="Times New Roman"/>
-              <a:sym typeface="Times New Roman"/>
-            </a:endParaRPr>
-          </a:p>
-          <a:p>
-            <a:pPr indent="-355600" lvl="1" marL="914400" rtl="0" algn="l">
-              <a:spcBef>
-                <a:spcPts val="0"/>
-              </a:spcBef>
-              <a:spcAft>
-                <a:spcPts val="0"/>
-              </a:spcAft>
-              <a:buClr>
-                <a:schemeClr val="dk1"/>
-              </a:buClr>
-              <a:buSzPts val="2000"/>
-              <a:buFont typeface="Times New Roman"/>
-              <a:buChar char="○"/>
-            </a:pPr>
-            <a:r>
-              <a:rPr lang="en" sz="2000">
-                <a:solidFill>
-                  <a:schemeClr val="dk1"/>
-                </a:solidFill>
-                <a:latin typeface="Times New Roman"/>
-                <a:ea typeface="Times New Roman"/>
-                <a:cs typeface="Times New Roman"/>
-                <a:sym typeface="Times New Roman"/>
-              </a:rPr>
-              <a:t>Arguments and parameters</a:t>
-            </a:r>
-            <a:endParaRPr sz="2000">
-              <a:solidFill>
-                <a:schemeClr val="dk1"/>
-              </a:solidFill>
-              <a:latin typeface="Times New Roman"/>
-              <a:ea typeface="Times New Roman"/>
-              <a:cs typeface="Times New Roman"/>
-              <a:sym typeface="Times New Roman"/>
-            </a:endParaRPr>
-          </a:p>
-          <a:p>
-            <a:pPr indent="-355600" lvl="1" marL="914400" rtl="0" algn="l">
-              <a:spcBef>
-                <a:spcPts val="0"/>
-              </a:spcBef>
-              <a:spcAft>
-                <a:spcPts val="0"/>
-              </a:spcAft>
-              <a:buClr>
-                <a:schemeClr val="dk1"/>
-              </a:buClr>
-              <a:buSzPts val="2000"/>
-              <a:buFont typeface="Times New Roman"/>
-              <a:buChar char="○"/>
-            </a:pPr>
-            <a:r>
-              <a:rPr lang="en" sz="2000">
-                <a:solidFill>
-                  <a:schemeClr val="dk1"/>
-                </a:solidFill>
-                <a:latin typeface="Times New Roman"/>
-                <a:ea typeface="Times New Roman"/>
-                <a:cs typeface="Times New Roman"/>
-                <a:sym typeface="Times New Roman"/>
-              </a:rPr>
-              <a:t>Scope</a:t>
-            </a:r>
-            <a:endParaRPr sz="2000">
-              <a:solidFill>
-                <a:schemeClr val="dk1"/>
-              </a:solidFill>
-              <a:latin typeface="Times New Roman"/>
-              <a:ea typeface="Times New Roman"/>
-              <a:cs typeface="Times New Roman"/>
-              <a:sym typeface="Times New Roman"/>
-            </a:endParaRPr>
-          </a:p>
-          <a:p>
-            <a:pPr indent="0" lvl="0" marL="0" rtl="0" algn="r">
-              <a:spcBef>
-                <a:spcPts val="185"/>
-              </a:spcBef>
-              <a:spcAft>
-                <a:spcPts val="0"/>
-              </a:spcAft>
-              <a:buClr>
-                <a:schemeClr val="dk1"/>
-              </a:buClr>
-              <a:buSzPts val="1100"/>
-              <a:buFont typeface="Arial"/>
-              <a:buNone/>
-            </a:pPr>
-            <a:r>
-              <a:t/>
-            </a:r>
-            <a:endParaRPr sz="1800">
+              <a:t>.html</a:t>
+            </a:r>
+            <a:endParaRPr b="1">
               <a:solidFill>
                 <a:schemeClr val="dk1"/>
               </a:solidFill>
@@ -13576,12 +13994,12 @@
 </p:sld>
 </file>
 
-<file path=ppt/slides/slide20.xml><?xml version="1.0" encoding="utf-8"?>
+<file path=ppt/slides/slide21.xml><?xml version="1.0" encoding="utf-8"?>
 <p:sld xmlns:a="http://schemas.openxmlformats.org/drawingml/2006/main" xmlns:r="http://schemas.openxmlformats.org/officeDocument/2006/relationships" xmlns:mc="http://schemas.openxmlformats.org/markup-compatibility/2006" xmlns:mv="urn:schemas-microsoft-com:mac:vml" xmlns:p="http://schemas.openxmlformats.org/presentationml/2006/main" xmlns:c="http://schemas.openxmlformats.org/drawingml/2006/chart" xmlns:dgm="http://schemas.openxmlformats.org/drawingml/2006/diagram" xmlns:o="urn:schemas-microsoft-com:office:office" xmlns:v="urn:schemas-microsoft-com:vml" xmlns:pvml="urn:schemas-microsoft-com:office:powerpoint" xmlns:com="http://schemas.openxmlformats.org/drawingml/2006/compatibility" xmlns:p14="http://schemas.microsoft.com/office/powerpoint/2010/main" xmlns:p15="http://schemas.microsoft.com/office/powerpoint/2012/main" xmlns:ahyp="http://schemas.microsoft.com/office/drawing/2018/hyperlinkcolor">
   <p:cSld>
     <p:spTree>
       <p:nvGrpSpPr>
-        <p:cNvPr id="197" name="Shape 197"/>
+        <p:cNvPr id="203" name="Shape 203"/>
         <p:cNvGrpSpPr/>
         <p:nvPr/>
       </p:nvGrpSpPr>
@@ -13595,7 +14013,7 @@
       </p:grpSpPr>
       <p:sp>
         <p:nvSpPr>
-          <p:cNvPr id="198" name="Google Shape;198;p33"/>
+          <p:cNvPr id="204" name="Google Shape;204;p34"/>
           <p:cNvSpPr txBox="1"/>
           <p:nvPr>
             <p:ph type="title"/>
@@ -13632,7 +14050,7 @@
                 <a:cs typeface="Times New Roman"/>
                 <a:sym typeface="Times New Roman"/>
               </a:rPr>
-              <a:t>Function declaration</a:t>
+              <a:t>Function call</a:t>
             </a:r>
             <a:endParaRPr sz="3000">
               <a:latin typeface="Times New Roman"/>
@@ -13645,7 +14063,7 @@
       </p:sp>
       <p:sp>
         <p:nvSpPr>
-          <p:cNvPr id="199" name="Google Shape;199;p33"/>
+          <p:cNvPr id="205" name="Google Shape;205;p34"/>
           <p:cNvSpPr txBox="1"/>
           <p:nvPr>
             <p:ph idx="1" type="body"/>
@@ -13654,7 +14072,7 @@
         <p:spPr>
           <a:xfrm>
             <a:off x="0" y="572700"/>
-            <a:ext cx="9144000" cy="4570800"/>
+            <a:ext cx="9144000" cy="4552500"/>
           </a:xfrm>
           <a:prstGeom prst="rect">
             <a:avLst/>
@@ -13673,11 +14091,6 @@
               <a:spcAft>
                 <a:spcPts val="0"/>
               </a:spcAft>
-              <a:buClr>
-                <a:schemeClr val="dk1"/>
-              </a:buClr>
-              <a:buSzPts val="1100"/>
-              <a:buFont typeface="Arial"/>
               <a:buNone/>
             </a:pPr>
             <a:r>
@@ -13710,11 +14123,6 @@
               <a:spcAft>
                 <a:spcPts val="0"/>
               </a:spcAft>
-              <a:buClr>
-                <a:schemeClr val="dk1"/>
-              </a:buClr>
-              <a:buSzPts val="1100"/>
-              <a:buFont typeface="Arial"/>
               <a:buNone/>
             </a:pPr>
             <a:r>
@@ -13747,11 +14155,6 @@
               <a:spcAft>
                 <a:spcPts val="0"/>
               </a:spcAft>
-              <a:buClr>
-                <a:schemeClr val="dk1"/>
-              </a:buClr>
-              <a:buSzPts val="1100"/>
-              <a:buFont typeface="Arial"/>
               <a:buNone/>
             </a:pPr>
             <a:r>
@@ -13782,13 +14185,8 @@
                 <a:spcPts val="1200"/>
               </a:spcBef>
               <a:spcAft>
-                <a:spcPts val="1200"/>
-              </a:spcAft>
-              <a:buClr>
-                <a:schemeClr val="dk1"/>
-              </a:buClr>
-              <a:buSzPts val="1100"/>
-              <a:buFont typeface="Arial"/>
+                <a:spcPts val="0"/>
+              </a:spcAft>
               <a:buNone/>
             </a:pPr>
             <a:r>
@@ -13813,11 +14211,690 @@
               <a:sym typeface="Courier New"/>
             </a:endParaRPr>
           </a:p>
+          <a:p>
+            <a:pPr indent="0" lvl="0" marL="0" rtl="0" algn="l">
+              <a:spcBef>
+                <a:spcPts val="1200"/>
+              </a:spcBef>
+              <a:spcAft>
+                <a:spcPts val="0"/>
+              </a:spcAft>
+              <a:buNone/>
+            </a:pPr>
+            <a:r>
+              <a:rPr lang="en">
+                <a:solidFill>
+                  <a:schemeClr val="dk1"/>
+                </a:solidFill>
+                <a:latin typeface="Courier New"/>
+                <a:ea typeface="Courier New"/>
+                <a:cs typeface="Courier New"/>
+                <a:sym typeface="Courier New"/>
+              </a:rPr>
+              <a:t>let a = 3;</a:t>
+            </a:r>
+            <a:endParaRPr>
+              <a:solidFill>
+                <a:schemeClr val="dk1"/>
+              </a:solidFill>
+              <a:latin typeface="Courier New"/>
+              <a:ea typeface="Courier New"/>
+              <a:cs typeface="Courier New"/>
+              <a:sym typeface="Courier New"/>
+            </a:endParaRPr>
+          </a:p>
+          <a:p>
+            <a:pPr indent="0" lvl="0" marL="0" rtl="0" algn="l">
+              <a:spcBef>
+                <a:spcPts val="1200"/>
+              </a:spcBef>
+              <a:spcAft>
+                <a:spcPts val="0"/>
+              </a:spcAft>
+              <a:buNone/>
+            </a:pPr>
+            <a:r>
+              <a:rPr lang="en">
+                <a:solidFill>
+                  <a:schemeClr val="dk1"/>
+                </a:solidFill>
+                <a:latin typeface="Courier New"/>
+                <a:ea typeface="Courier New"/>
+                <a:cs typeface="Courier New"/>
+                <a:sym typeface="Courier New"/>
+              </a:rPr>
+              <a:t>let b = multiplyByThree(a);</a:t>
+            </a:r>
+            <a:endParaRPr>
+              <a:solidFill>
+                <a:schemeClr val="dk1"/>
+              </a:solidFill>
+              <a:latin typeface="Courier New"/>
+              <a:ea typeface="Courier New"/>
+              <a:cs typeface="Courier New"/>
+              <a:sym typeface="Courier New"/>
+            </a:endParaRPr>
+          </a:p>
+          <a:p>
+            <a:pPr indent="0" lvl="0" marL="0" rtl="0" algn="l">
+              <a:spcBef>
+                <a:spcPts val="1200"/>
+              </a:spcBef>
+              <a:spcAft>
+                <a:spcPts val="1200"/>
+              </a:spcAft>
+              <a:buNone/>
+            </a:pPr>
+            <a:r>
+              <a:rPr lang="en">
+                <a:solidFill>
+                  <a:schemeClr val="dk1"/>
+                </a:solidFill>
+                <a:latin typeface="Courier New"/>
+                <a:ea typeface="Courier New"/>
+                <a:cs typeface="Courier New"/>
+                <a:sym typeface="Courier New"/>
+              </a:rPr>
+              <a:t>console.log(b);</a:t>
+            </a:r>
+            <a:endParaRPr>
+              <a:solidFill>
+                <a:schemeClr val="dk1"/>
+              </a:solidFill>
+              <a:latin typeface="Courier New"/>
+              <a:ea typeface="Courier New"/>
+              <a:cs typeface="Courier New"/>
+              <a:sym typeface="Courier New"/>
+            </a:endParaRPr>
+          </a:p>
+        </p:txBody>
+      </p:sp>
+    </p:spTree>
+  </p:cSld>
+  <p:clrMapOvr>
+    <a:masterClrMapping/>
+  </p:clrMapOvr>
+</p:sld>
+</file>
+
+<file path=ppt/slides/slide22.xml><?xml version="1.0" encoding="utf-8"?>
+<p:sld xmlns:a="http://schemas.openxmlformats.org/drawingml/2006/main" xmlns:r="http://schemas.openxmlformats.org/officeDocument/2006/relationships" xmlns:mc="http://schemas.openxmlformats.org/markup-compatibility/2006" xmlns:mv="urn:schemas-microsoft-com:mac:vml" xmlns:p="http://schemas.openxmlformats.org/presentationml/2006/main" xmlns:c="http://schemas.openxmlformats.org/drawingml/2006/chart" xmlns:dgm="http://schemas.openxmlformats.org/drawingml/2006/diagram" xmlns:o="urn:schemas-microsoft-com:office:office" xmlns:v="urn:schemas-microsoft-com:vml" xmlns:pvml="urn:schemas-microsoft-com:office:powerpoint" xmlns:com="http://schemas.openxmlformats.org/drawingml/2006/compatibility" xmlns:p14="http://schemas.microsoft.com/office/powerpoint/2010/main" xmlns:p15="http://schemas.microsoft.com/office/powerpoint/2012/main" xmlns:ahyp="http://schemas.microsoft.com/office/drawing/2018/hyperlinkcolor">
+  <p:cSld>
+    <p:spTree>
+      <p:nvGrpSpPr>
+        <p:cNvPr id="209" name="Shape 209"/>
+        <p:cNvGrpSpPr/>
+        <p:nvPr/>
+      </p:nvGrpSpPr>
+      <p:grpSpPr>
+        <a:xfrm>
+          <a:off x="0" y="0"/>
+          <a:ext cx="0" cy="0"/>
+          <a:chOff x="0" y="0"/>
+          <a:chExt cx="0" cy="0"/>
+        </a:xfrm>
+      </p:grpSpPr>
+      <p:sp>
+        <p:nvSpPr>
+          <p:cNvPr id="210" name="Google Shape;210;p35"/>
+          <p:cNvSpPr txBox="1"/>
+          <p:nvPr>
+            <p:ph type="title"/>
+          </p:nvPr>
+        </p:nvSpPr>
+        <p:spPr>
+          <a:xfrm>
+            <a:off x="0" y="0"/>
+            <a:ext cx="9144000" cy="572700"/>
+          </a:xfrm>
+          <a:prstGeom prst="rect">
+            <a:avLst/>
+          </a:prstGeom>
+        </p:spPr>
+        <p:txBody>
+          <a:bodyPr anchorCtr="0" anchor="t" bIns="91425" lIns="91425" spcFirstLastPara="1" rIns="91425" wrap="square" tIns="91425">
+            <a:noAutofit/>
+          </a:bodyPr>
+          <a:lstStyle/>
+          <a:p>
+            <a:pPr indent="0" lvl="0" marL="0" rtl="0" algn="l">
+              <a:spcBef>
+                <a:spcPts val="0"/>
+              </a:spcBef>
+              <a:spcAft>
+                <a:spcPts val="0"/>
+              </a:spcAft>
+              <a:buNone/>
+            </a:pPr>
+            <a:r>
+              <a:rPr lang="en" sz="3000">
+                <a:latin typeface="Times New Roman"/>
+                <a:ea typeface="Times New Roman"/>
+                <a:cs typeface="Times New Roman"/>
+                <a:sym typeface="Times New Roman"/>
+              </a:rPr>
+              <a:t>Function declaration and call comparison</a:t>
+            </a:r>
+            <a:endParaRPr sz="3000">
+              <a:latin typeface="Times New Roman"/>
+              <a:ea typeface="Times New Roman"/>
+              <a:cs typeface="Times New Roman"/>
+              <a:sym typeface="Times New Roman"/>
+            </a:endParaRPr>
+          </a:p>
         </p:txBody>
       </p:sp>
       <p:sp>
         <p:nvSpPr>
-          <p:cNvPr id="200" name="Google Shape;200;p33"/>
+          <p:cNvPr id="211" name="Google Shape;211;p35"/>
+          <p:cNvSpPr txBox="1"/>
+          <p:nvPr>
+            <p:ph idx="1" type="body"/>
+          </p:nvPr>
+        </p:nvSpPr>
+        <p:spPr>
+          <a:xfrm>
+            <a:off x="4133100" y="572700"/>
+            <a:ext cx="5010900" cy="4570800"/>
+          </a:xfrm>
+          <a:prstGeom prst="rect">
+            <a:avLst/>
+          </a:prstGeom>
+        </p:spPr>
+        <p:txBody>
+          <a:bodyPr anchorCtr="0" anchor="t" bIns="91425" lIns="91425" spcFirstLastPara="1" rIns="91425" wrap="square" tIns="91425">
+            <a:normAutofit/>
+          </a:bodyPr>
+          <a:lstStyle/>
+          <a:p>
+            <a:pPr indent="0" lvl="0" marL="0" rtl="0" algn="l">
+              <a:spcBef>
+                <a:spcPts val="0"/>
+              </a:spcBef>
+              <a:spcAft>
+                <a:spcPts val="0"/>
+              </a:spcAft>
+              <a:buNone/>
+            </a:pPr>
+            <a:r>
+              <a:rPr b="1" lang="en">
+                <a:solidFill>
+                  <a:schemeClr val="dk1"/>
+                </a:solidFill>
+                <a:latin typeface="Courier New"/>
+                <a:ea typeface="Courier New"/>
+                <a:cs typeface="Courier New"/>
+                <a:sym typeface="Courier New"/>
+              </a:rPr>
+              <a:t>const</a:t>
+            </a:r>
+            <a:r>
+              <a:rPr lang="en">
+                <a:solidFill>
+                  <a:schemeClr val="dk1"/>
+                </a:solidFill>
+                <a:latin typeface="Courier New"/>
+                <a:ea typeface="Courier New"/>
+                <a:cs typeface="Courier New"/>
+                <a:sym typeface="Courier New"/>
+              </a:rPr>
+              <a:t> multiplyByThree = function(a)</a:t>
+            </a:r>
+            <a:endParaRPr>
+              <a:solidFill>
+                <a:schemeClr val="dk1"/>
+              </a:solidFill>
+              <a:latin typeface="Courier New"/>
+              <a:ea typeface="Courier New"/>
+              <a:cs typeface="Courier New"/>
+              <a:sym typeface="Courier New"/>
+            </a:endParaRPr>
+          </a:p>
+          <a:p>
+            <a:pPr indent="0" lvl="0" marL="0" rtl="0" algn="l">
+              <a:spcBef>
+                <a:spcPts val="1200"/>
+              </a:spcBef>
+              <a:spcAft>
+                <a:spcPts val="0"/>
+              </a:spcAft>
+              <a:buNone/>
+            </a:pPr>
+            <a:r>
+              <a:rPr lang="en">
+                <a:solidFill>
+                  <a:schemeClr val="dk1"/>
+                </a:solidFill>
+                <a:latin typeface="Courier New"/>
+                <a:ea typeface="Courier New"/>
+                <a:cs typeface="Courier New"/>
+                <a:sym typeface="Courier New"/>
+              </a:rPr>
+              <a:t>{</a:t>
+            </a:r>
+            <a:endParaRPr>
+              <a:solidFill>
+                <a:schemeClr val="dk1"/>
+              </a:solidFill>
+              <a:latin typeface="Courier New"/>
+              <a:ea typeface="Courier New"/>
+              <a:cs typeface="Courier New"/>
+              <a:sym typeface="Courier New"/>
+            </a:endParaRPr>
+          </a:p>
+          <a:p>
+            <a:pPr indent="457200" lvl="0" marL="0" rtl="0" algn="l">
+              <a:spcBef>
+                <a:spcPts val="1200"/>
+              </a:spcBef>
+              <a:spcAft>
+                <a:spcPts val="0"/>
+              </a:spcAft>
+              <a:buNone/>
+            </a:pPr>
+            <a:r>
+              <a:rPr lang="en">
+                <a:solidFill>
+                  <a:schemeClr val="dk1"/>
+                </a:solidFill>
+                <a:latin typeface="Courier New"/>
+                <a:ea typeface="Courier New"/>
+                <a:cs typeface="Courier New"/>
+                <a:sym typeface="Courier New"/>
+              </a:rPr>
+              <a:t>return a * 3;</a:t>
+            </a:r>
+            <a:endParaRPr>
+              <a:solidFill>
+                <a:schemeClr val="dk1"/>
+              </a:solidFill>
+              <a:latin typeface="Courier New"/>
+              <a:ea typeface="Courier New"/>
+              <a:cs typeface="Courier New"/>
+              <a:sym typeface="Courier New"/>
+            </a:endParaRPr>
+          </a:p>
+          <a:p>
+            <a:pPr indent="0" lvl="0" marL="0" rtl="0" algn="l">
+              <a:spcBef>
+                <a:spcPts val="1200"/>
+              </a:spcBef>
+              <a:spcAft>
+                <a:spcPts val="0"/>
+              </a:spcAft>
+              <a:buNone/>
+            </a:pPr>
+            <a:r>
+              <a:rPr lang="en">
+                <a:solidFill>
+                  <a:schemeClr val="dk1"/>
+                </a:solidFill>
+                <a:latin typeface="Courier New"/>
+                <a:ea typeface="Courier New"/>
+                <a:cs typeface="Courier New"/>
+                <a:sym typeface="Courier New"/>
+              </a:rPr>
+              <a:t>}</a:t>
+            </a:r>
+            <a:endParaRPr>
+              <a:solidFill>
+                <a:schemeClr val="dk1"/>
+              </a:solidFill>
+              <a:latin typeface="Courier New"/>
+              <a:ea typeface="Courier New"/>
+              <a:cs typeface="Courier New"/>
+              <a:sym typeface="Courier New"/>
+            </a:endParaRPr>
+          </a:p>
+          <a:p>
+            <a:pPr indent="0" lvl="0" marL="0" rtl="0" algn="l">
+              <a:spcBef>
+                <a:spcPts val="1200"/>
+              </a:spcBef>
+              <a:spcAft>
+                <a:spcPts val="0"/>
+              </a:spcAft>
+              <a:buNone/>
+            </a:pPr>
+            <a:r>
+              <a:rPr lang="en">
+                <a:solidFill>
+                  <a:schemeClr val="dk1"/>
+                </a:solidFill>
+                <a:latin typeface="Courier New"/>
+                <a:ea typeface="Courier New"/>
+                <a:cs typeface="Courier New"/>
+                <a:sym typeface="Courier New"/>
+              </a:rPr>
+              <a:t>let a = 3;</a:t>
+            </a:r>
+            <a:endParaRPr>
+              <a:solidFill>
+                <a:schemeClr val="dk1"/>
+              </a:solidFill>
+              <a:latin typeface="Courier New"/>
+              <a:ea typeface="Courier New"/>
+              <a:cs typeface="Courier New"/>
+              <a:sym typeface="Courier New"/>
+            </a:endParaRPr>
+          </a:p>
+          <a:p>
+            <a:pPr indent="0" lvl="0" marL="0" rtl="0" algn="l">
+              <a:spcBef>
+                <a:spcPts val="1200"/>
+              </a:spcBef>
+              <a:spcAft>
+                <a:spcPts val="0"/>
+              </a:spcAft>
+              <a:buNone/>
+            </a:pPr>
+            <a:r>
+              <a:rPr lang="en">
+                <a:solidFill>
+                  <a:schemeClr val="dk1"/>
+                </a:solidFill>
+                <a:latin typeface="Courier New"/>
+                <a:ea typeface="Courier New"/>
+                <a:cs typeface="Courier New"/>
+                <a:sym typeface="Courier New"/>
+              </a:rPr>
+              <a:t>let b = multiplyByThree(a);</a:t>
+            </a:r>
+            <a:endParaRPr>
+              <a:solidFill>
+                <a:schemeClr val="dk1"/>
+              </a:solidFill>
+              <a:latin typeface="Courier New"/>
+              <a:ea typeface="Courier New"/>
+              <a:cs typeface="Courier New"/>
+              <a:sym typeface="Courier New"/>
+            </a:endParaRPr>
+          </a:p>
+          <a:p>
+            <a:pPr indent="0" lvl="0" marL="0" rtl="0" algn="l">
+              <a:spcBef>
+                <a:spcPts val="1200"/>
+              </a:spcBef>
+              <a:spcAft>
+                <a:spcPts val="1200"/>
+              </a:spcAft>
+              <a:buNone/>
+            </a:pPr>
+            <a:r>
+              <a:rPr lang="en">
+                <a:solidFill>
+                  <a:schemeClr val="dk1"/>
+                </a:solidFill>
+                <a:latin typeface="Courier New"/>
+                <a:ea typeface="Courier New"/>
+                <a:cs typeface="Courier New"/>
+                <a:sym typeface="Courier New"/>
+              </a:rPr>
+              <a:t>console.log(b);</a:t>
+            </a:r>
+            <a:endParaRPr>
+              <a:solidFill>
+                <a:schemeClr val="dk1"/>
+              </a:solidFill>
+              <a:latin typeface="Courier New"/>
+              <a:ea typeface="Courier New"/>
+              <a:cs typeface="Courier New"/>
+              <a:sym typeface="Courier New"/>
+            </a:endParaRPr>
+          </a:p>
+        </p:txBody>
+      </p:sp>
+      <p:sp>
+        <p:nvSpPr>
+          <p:cNvPr id="212" name="Google Shape;212;p35"/>
+          <p:cNvSpPr txBox="1"/>
+          <p:nvPr>
+            <p:ph idx="1" type="body"/>
+          </p:nvPr>
+        </p:nvSpPr>
+        <p:spPr>
+          <a:xfrm>
+            <a:off x="0" y="572700"/>
+            <a:ext cx="4133100" cy="4570800"/>
+          </a:xfrm>
+          <a:prstGeom prst="rect">
+            <a:avLst/>
+          </a:prstGeom>
+        </p:spPr>
+        <p:txBody>
+          <a:bodyPr anchorCtr="0" anchor="t" bIns="91425" lIns="91425" spcFirstLastPara="1" rIns="91425" wrap="square" tIns="91425">
+            <a:normAutofit/>
+          </a:bodyPr>
+          <a:lstStyle/>
+          <a:p>
+            <a:pPr indent="0" lvl="0" marL="0" rtl="0" algn="l">
+              <a:spcBef>
+                <a:spcPts val="0"/>
+              </a:spcBef>
+              <a:spcAft>
+                <a:spcPts val="0"/>
+              </a:spcAft>
+              <a:buNone/>
+            </a:pPr>
+            <a:r>
+              <a:rPr lang="en">
+                <a:solidFill>
+                  <a:schemeClr val="dk1"/>
+                </a:solidFill>
+                <a:latin typeface="Courier New"/>
+                <a:ea typeface="Courier New"/>
+                <a:cs typeface="Courier New"/>
+                <a:sym typeface="Courier New"/>
+              </a:rPr>
+              <a:t>function multiplyByTwo(a)</a:t>
+            </a:r>
+            <a:endParaRPr>
+              <a:solidFill>
+                <a:schemeClr val="dk1"/>
+              </a:solidFill>
+              <a:latin typeface="Courier New"/>
+              <a:ea typeface="Courier New"/>
+              <a:cs typeface="Courier New"/>
+              <a:sym typeface="Courier New"/>
+            </a:endParaRPr>
+          </a:p>
+          <a:p>
+            <a:pPr indent="0" lvl="0" marL="0" rtl="0" algn="l">
+              <a:spcBef>
+                <a:spcPts val="1200"/>
+              </a:spcBef>
+              <a:spcAft>
+                <a:spcPts val="0"/>
+              </a:spcAft>
+              <a:buNone/>
+            </a:pPr>
+            <a:r>
+              <a:rPr lang="en">
+                <a:solidFill>
+                  <a:schemeClr val="dk1"/>
+                </a:solidFill>
+                <a:latin typeface="Courier New"/>
+                <a:ea typeface="Courier New"/>
+                <a:cs typeface="Courier New"/>
+                <a:sym typeface="Courier New"/>
+              </a:rPr>
+              <a:t>{</a:t>
+            </a:r>
+            <a:endParaRPr>
+              <a:solidFill>
+                <a:schemeClr val="dk1"/>
+              </a:solidFill>
+              <a:latin typeface="Courier New"/>
+              <a:ea typeface="Courier New"/>
+              <a:cs typeface="Courier New"/>
+              <a:sym typeface="Courier New"/>
+            </a:endParaRPr>
+          </a:p>
+          <a:p>
+            <a:pPr indent="0" lvl="0" marL="0" rtl="0" algn="l">
+              <a:spcBef>
+                <a:spcPts val="1200"/>
+              </a:spcBef>
+              <a:spcAft>
+                <a:spcPts val="0"/>
+              </a:spcAft>
+              <a:buNone/>
+            </a:pPr>
+            <a:r>
+              <a:rPr lang="en">
+                <a:solidFill>
+                  <a:schemeClr val="dk1"/>
+                </a:solidFill>
+                <a:latin typeface="Courier New"/>
+                <a:ea typeface="Courier New"/>
+                <a:cs typeface="Courier New"/>
+                <a:sym typeface="Courier New"/>
+              </a:rPr>
+              <a:t>	return a * 2;</a:t>
+            </a:r>
+            <a:endParaRPr>
+              <a:solidFill>
+                <a:schemeClr val="dk1"/>
+              </a:solidFill>
+              <a:latin typeface="Courier New"/>
+              <a:ea typeface="Courier New"/>
+              <a:cs typeface="Courier New"/>
+              <a:sym typeface="Courier New"/>
+            </a:endParaRPr>
+          </a:p>
+          <a:p>
+            <a:pPr indent="0" lvl="0" marL="0" rtl="0" algn="l">
+              <a:spcBef>
+                <a:spcPts val="1200"/>
+              </a:spcBef>
+              <a:spcAft>
+                <a:spcPts val="0"/>
+              </a:spcAft>
+              <a:buNone/>
+            </a:pPr>
+            <a:r>
+              <a:rPr lang="en">
+                <a:solidFill>
+                  <a:schemeClr val="dk1"/>
+                </a:solidFill>
+                <a:latin typeface="Courier New"/>
+                <a:ea typeface="Courier New"/>
+                <a:cs typeface="Courier New"/>
+                <a:sym typeface="Courier New"/>
+              </a:rPr>
+              <a:t>}</a:t>
+            </a:r>
+            <a:endParaRPr>
+              <a:solidFill>
+                <a:schemeClr val="dk1"/>
+              </a:solidFill>
+              <a:latin typeface="Courier New"/>
+              <a:ea typeface="Courier New"/>
+              <a:cs typeface="Courier New"/>
+              <a:sym typeface="Courier New"/>
+            </a:endParaRPr>
+          </a:p>
+          <a:p>
+            <a:pPr indent="0" lvl="0" marL="0" rtl="0" algn="l">
+              <a:spcBef>
+                <a:spcPts val="1200"/>
+              </a:spcBef>
+              <a:spcAft>
+                <a:spcPts val="0"/>
+              </a:spcAft>
+              <a:buNone/>
+            </a:pPr>
+            <a:r>
+              <a:rPr lang="en">
+                <a:solidFill>
+                  <a:schemeClr val="dk1"/>
+                </a:solidFill>
+                <a:latin typeface="Courier New"/>
+                <a:ea typeface="Courier New"/>
+                <a:cs typeface="Courier New"/>
+                <a:sym typeface="Courier New"/>
+              </a:rPr>
+              <a:t>let a = 3;</a:t>
+            </a:r>
+            <a:endParaRPr>
+              <a:solidFill>
+                <a:schemeClr val="dk1"/>
+              </a:solidFill>
+              <a:latin typeface="Courier New"/>
+              <a:ea typeface="Courier New"/>
+              <a:cs typeface="Courier New"/>
+              <a:sym typeface="Courier New"/>
+            </a:endParaRPr>
+          </a:p>
+          <a:p>
+            <a:pPr indent="0" lvl="0" marL="0" rtl="0" algn="l">
+              <a:spcBef>
+                <a:spcPts val="1200"/>
+              </a:spcBef>
+              <a:spcAft>
+                <a:spcPts val="0"/>
+              </a:spcAft>
+              <a:buNone/>
+            </a:pPr>
+            <a:r>
+              <a:rPr lang="en">
+                <a:solidFill>
+                  <a:schemeClr val="dk1"/>
+                </a:solidFill>
+                <a:latin typeface="Courier New"/>
+                <a:ea typeface="Courier New"/>
+                <a:cs typeface="Courier New"/>
+                <a:sym typeface="Courier New"/>
+              </a:rPr>
+              <a:t>let b = multiplyByTwo(a);</a:t>
+            </a:r>
+            <a:endParaRPr>
+              <a:solidFill>
+                <a:schemeClr val="dk1"/>
+              </a:solidFill>
+              <a:latin typeface="Courier New"/>
+              <a:ea typeface="Courier New"/>
+              <a:cs typeface="Courier New"/>
+              <a:sym typeface="Courier New"/>
+            </a:endParaRPr>
+          </a:p>
+          <a:p>
+            <a:pPr indent="0" lvl="0" marL="0" rtl="0" algn="l">
+              <a:spcBef>
+                <a:spcPts val="1200"/>
+              </a:spcBef>
+              <a:spcAft>
+                <a:spcPts val="1200"/>
+              </a:spcAft>
+              <a:buNone/>
+            </a:pPr>
+            <a:r>
+              <a:rPr lang="en">
+                <a:solidFill>
+                  <a:schemeClr val="dk1"/>
+                </a:solidFill>
+                <a:latin typeface="Courier New"/>
+                <a:ea typeface="Courier New"/>
+                <a:cs typeface="Courier New"/>
+                <a:sym typeface="Courier New"/>
+              </a:rPr>
+              <a:t>console.log(b);</a:t>
+            </a:r>
+            <a:endParaRPr>
+              <a:solidFill>
+                <a:schemeClr val="dk1"/>
+              </a:solidFill>
+              <a:latin typeface="Courier New"/>
+              <a:ea typeface="Courier New"/>
+              <a:cs typeface="Courier New"/>
+              <a:sym typeface="Courier New"/>
+            </a:endParaRPr>
+          </a:p>
+        </p:txBody>
+      </p:sp>
+      <p:sp>
+        <p:nvSpPr>
+          <p:cNvPr id="213" name="Google Shape;213;p35"/>
           <p:cNvSpPr txBox="1"/>
           <p:nvPr/>
         </p:nvSpPr>
@@ -13862,985 +14939,6 @@
                 <a:cs typeface="Times New Roman"/>
                 <a:sym typeface="Times New Roman"/>
               </a:rPr>
-              <a:t>10</a:t>
-            </a:r>
-            <a:r>
-              <a:rPr b="1" lang="en">
-                <a:solidFill>
-                  <a:schemeClr val="dk1"/>
-                </a:solidFill>
-                <a:latin typeface="Times New Roman"/>
-                <a:ea typeface="Times New Roman"/>
-                <a:cs typeface="Times New Roman"/>
-                <a:sym typeface="Times New Roman"/>
-              </a:rPr>
-              <a:t>.html</a:t>
-            </a:r>
-            <a:endParaRPr b="1">
-              <a:solidFill>
-                <a:schemeClr val="dk1"/>
-              </a:solidFill>
-              <a:latin typeface="Times New Roman"/>
-              <a:ea typeface="Times New Roman"/>
-              <a:cs typeface="Times New Roman"/>
-              <a:sym typeface="Times New Roman"/>
-            </a:endParaRPr>
-          </a:p>
-        </p:txBody>
-      </p:sp>
-    </p:spTree>
-  </p:cSld>
-  <p:clrMapOvr>
-    <a:masterClrMapping/>
-  </p:clrMapOvr>
-</p:sld>
-</file>
-
-<file path=ppt/slides/slide21.xml><?xml version="1.0" encoding="utf-8"?>
-<p:sld xmlns:a="http://schemas.openxmlformats.org/drawingml/2006/main" xmlns:r="http://schemas.openxmlformats.org/officeDocument/2006/relationships" xmlns:mc="http://schemas.openxmlformats.org/markup-compatibility/2006" xmlns:mv="urn:schemas-microsoft-com:mac:vml" xmlns:p="http://schemas.openxmlformats.org/presentationml/2006/main" xmlns:c="http://schemas.openxmlformats.org/drawingml/2006/chart" xmlns:dgm="http://schemas.openxmlformats.org/drawingml/2006/diagram" xmlns:o="urn:schemas-microsoft-com:office:office" xmlns:v="urn:schemas-microsoft-com:vml" xmlns:pvml="urn:schemas-microsoft-com:office:powerpoint" xmlns:com="http://schemas.openxmlformats.org/drawingml/2006/compatibility" xmlns:p14="http://schemas.microsoft.com/office/powerpoint/2010/main" xmlns:p15="http://schemas.microsoft.com/office/powerpoint/2012/main" xmlns:ahyp="http://schemas.microsoft.com/office/drawing/2018/hyperlinkcolor">
-  <p:cSld>
-    <p:spTree>
-      <p:nvGrpSpPr>
-        <p:cNvPr id="204" name="Shape 204"/>
-        <p:cNvGrpSpPr/>
-        <p:nvPr/>
-      </p:nvGrpSpPr>
-      <p:grpSpPr>
-        <a:xfrm>
-          <a:off x="0" y="0"/>
-          <a:ext cx="0" cy="0"/>
-          <a:chOff x="0" y="0"/>
-          <a:chExt cx="0" cy="0"/>
-        </a:xfrm>
-      </p:grpSpPr>
-      <p:sp>
-        <p:nvSpPr>
-          <p:cNvPr id="205" name="Google Shape;205;p34"/>
-          <p:cNvSpPr txBox="1"/>
-          <p:nvPr>
-            <p:ph type="title"/>
-          </p:nvPr>
-        </p:nvSpPr>
-        <p:spPr>
-          <a:xfrm>
-            <a:off x="0" y="0"/>
-            <a:ext cx="9144000" cy="572700"/>
-          </a:xfrm>
-          <a:prstGeom prst="rect">
-            <a:avLst/>
-          </a:prstGeom>
-        </p:spPr>
-        <p:txBody>
-          <a:bodyPr anchorCtr="0" anchor="t" bIns="91425" lIns="91425" spcFirstLastPara="1" rIns="91425" wrap="square" tIns="91425">
-            <a:noAutofit/>
-          </a:bodyPr>
-          <a:lstStyle/>
-          <a:p>
-            <a:pPr indent="0" lvl="0" marL="0" rtl="0" algn="l">
-              <a:spcBef>
-                <a:spcPts val="0"/>
-              </a:spcBef>
-              <a:spcAft>
-                <a:spcPts val="0"/>
-              </a:spcAft>
-              <a:buNone/>
-            </a:pPr>
-            <a:r>
-              <a:rPr lang="en" sz="3000">
-                <a:latin typeface="Times New Roman"/>
-                <a:ea typeface="Times New Roman"/>
-                <a:cs typeface="Times New Roman"/>
-                <a:sym typeface="Times New Roman"/>
-              </a:rPr>
-              <a:t>Function call</a:t>
-            </a:r>
-            <a:endParaRPr sz="3000">
-              <a:latin typeface="Times New Roman"/>
-              <a:ea typeface="Times New Roman"/>
-              <a:cs typeface="Times New Roman"/>
-              <a:sym typeface="Times New Roman"/>
-            </a:endParaRPr>
-          </a:p>
-        </p:txBody>
-      </p:sp>
-      <p:sp>
-        <p:nvSpPr>
-          <p:cNvPr id="206" name="Google Shape;206;p34"/>
-          <p:cNvSpPr txBox="1"/>
-          <p:nvPr>
-            <p:ph idx="1" type="body"/>
-          </p:nvPr>
-        </p:nvSpPr>
-        <p:spPr>
-          <a:xfrm>
-            <a:off x="0" y="572700"/>
-            <a:ext cx="9144000" cy="4552500"/>
-          </a:xfrm>
-          <a:prstGeom prst="rect">
-            <a:avLst/>
-          </a:prstGeom>
-        </p:spPr>
-        <p:txBody>
-          <a:bodyPr anchorCtr="0" anchor="t" bIns="91425" lIns="91425" spcFirstLastPara="1" rIns="91425" wrap="square" tIns="91425">
-            <a:normAutofit/>
-          </a:bodyPr>
-          <a:lstStyle/>
-          <a:p>
-            <a:pPr indent="0" lvl="0" marL="0" rtl="0" algn="l">
-              <a:spcBef>
-                <a:spcPts val="0"/>
-              </a:spcBef>
-              <a:spcAft>
-                <a:spcPts val="0"/>
-              </a:spcAft>
-              <a:buNone/>
-            </a:pPr>
-            <a:r>
-              <a:rPr lang="en">
-                <a:solidFill>
-                  <a:schemeClr val="dk1"/>
-                </a:solidFill>
-                <a:latin typeface="Courier New"/>
-                <a:ea typeface="Courier New"/>
-                <a:cs typeface="Courier New"/>
-                <a:sym typeface="Courier New"/>
-              </a:rPr>
-              <a:t>const multiplyByThree = function(a)</a:t>
-            </a:r>
-            <a:endParaRPr>
-              <a:solidFill>
-                <a:schemeClr val="dk1"/>
-              </a:solidFill>
-              <a:latin typeface="Courier New"/>
-              <a:ea typeface="Courier New"/>
-              <a:cs typeface="Courier New"/>
-              <a:sym typeface="Courier New"/>
-            </a:endParaRPr>
-          </a:p>
-          <a:p>
-            <a:pPr indent="0" lvl="0" marL="0" rtl="0" algn="l">
-              <a:spcBef>
-                <a:spcPts val="1200"/>
-              </a:spcBef>
-              <a:spcAft>
-                <a:spcPts val="0"/>
-              </a:spcAft>
-              <a:buNone/>
-            </a:pPr>
-            <a:r>
-              <a:rPr lang="en">
-                <a:solidFill>
-                  <a:schemeClr val="dk1"/>
-                </a:solidFill>
-                <a:latin typeface="Courier New"/>
-                <a:ea typeface="Courier New"/>
-                <a:cs typeface="Courier New"/>
-                <a:sym typeface="Courier New"/>
-              </a:rPr>
-              <a:t>{</a:t>
-            </a:r>
-            <a:endParaRPr>
-              <a:solidFill>
-                <a:schemeClr val="dk1"/>
-              </a:solidFill>
-              <a:latin typeface="Courier New"/>
-              <a:ea typeface="Courier New"/>
-              <a:cs typeface="Courier New"/>
-              <a:sym typeface="Courier New"/>
-            </a:endParaRPr>
-          </a:p>
-          <a:p>
-            <a:pPr indent="457200" lvl="0" marL="0" rtl="0" algn="l">
-              <a:spcBef>
-                <a:spcPts val="1200"/>
-              </a:spcBef>
-              <a:spcAft>
-                <a:spcPts val="0"/>
-              </a:spcAft>
-              <a:buNone/>
-            </a:pPr>
-            <a:r>
-              <a:rPr lang="en">
-                <a:solidFill>
-                  <a:schemeClr val="dk1"/>
-                </a:solidFill>
-                <a:latin typeface="Courier New"/>
-                <a:ea typeface="Courier New"/>
-                <a:cs typeface="Courier New"/>
-                <a:sym typeface="Courier New"/>
-              </a:rPr>
-              <a:t>return a * 3;</a:t>
-            </a:r>
-            <a:endParaRPr>
-              <a:solidFill>
-                <a:schemeClr val="dk1"/>
-              </a:solidFill>
-              <a:latin typeface="Courier New"/>
-              <a:ea typeface="Courier New"/>
-              <a:cs typeface="Courier New"/>
-              <a:sym typeface="Courier New"/>
-            </a:endParaRPr>
-          </a:p>
-          <a:p>
-            <a:pPr indent="0" lvl="0" marL="0" rtl="0" algn="l">
-              <a:spcBef>
-                <a:spcPts val="1200"/>
-              </a:spcBef>
-              <a:spcAft>
-                <a:spcPts val="0"/>
-              </a:spcAft>
-              <a:buNone/>
-            </a:pPr>
-            <a:r>
-              <a:rPr lang="en">
-                <a:solidFill>
-                  <a:schemeClr val="dk1"/>
-                </a:solidFill>
-                <a:latin typeface="Courier New"/>
-                <a:ea typeface="Courier New"/>
-                <a:cs typeface="Courier New"/>
-                <a:sym typeface="Courier New"/>
-              </a:rPr>
-              <a:t>}</a:t>
-            </a:r>
-            <a:endParaRPr>
-              <a:solidFill>
-                <a:schemeClr val="dk1"/>
-              </a:solidFill>
-              <a:latin typeface="Courier New"/>
-              <a:ea typeface="Courier New"/>
-              <a:cs typeface="Courier New"/>
-              <a:sym typeface="Courier New"/>
-            </a:endParaRPr>
-          </a:p>
-          <a:p>
-            <a:pPr indent="0" lvl="0" marL="0" rtl="0" algn="l">
-              <a:spcBef>
-                <a:spcPts val="1200"/>
-              </a:spcBef>
-              <a:spcAft>
-                <a:spcPts val="0"/>
-              </a:spcAft>
-              <a:buNone/>
-            </a:pPr>
-            <a:r>
-              <a:rPr lang="en">
-                <a:solidFill>
-                  <a:schemeClr val="dk1"/>
-                </a:solidFill>
-                <a:latin typeface="Courier New"/>
-                <a:ea typeface="Courier New"/>
-                <a:cs typeface="Courier New"/>
-                <a:sym typeface="Courier New"/>
-              </a:rPr>
-              <a:t>let a = 3;</a:t>
-            </a:r>
-            <a:endParaRPr>
-              <a:solidFill>
-                <a:schemeClr val="dk1"/>
-              </a:solidFill>
-              <a:latin typeface="Courier New"/>
-              <a:ea typeface="Courier New"/>
-              <a:cs typeface="Courier New"/>
-              <a:sym typeface="Courier New"/>
-            </a:endParaRPr>
-          </a:p>
-          <a:p>
-            <a:pPr indent="0" lvl="0" marL="0" rtl="0" algn="l">
-              <a:spcBef>
-                <a:spcPts val="1200"/>
-              </a:spcBef>
-              <a:spcAft>
-                <a:spcPts val="0"/>
-              </a:spcAft>
-              <a:buNone/>
-            </a:pPr>
-            <a:r>
-              <a:rPr lang="en">
-                <a:solidFill>
-                  <a:schemeClr val="dk1"/>
-                </a:solidFill>
-                <a:latin typeface="Courier New"/>
-                <a:ea typeface="Courier New"/>
-                <a:cs typeface="Courier New"/>
-                <a:sym typeface="Courier New"/>
-              </a:rPr>
-              <a:t>let b = multiplyByThree(a);</a:t>
-            </a:r>
-            <a:endParaRPr>
-              <a:solidFill>
-                <a:schemeClr val="dk1"/>
-              </a:solidFill>
-              <a:latin typeface="Courier New"/>
-              <a:ea typeface="Courier New"/>
-              <a:cs typeface="Courier New"/>
-              <a:sym typeface="Courier New"/>
-            </a:endParaRPr>
-          </a:p>
-          <a:p>
-            <a:pPr indent="0" lvl="0" marL="0" rtl="0" algn="l">
-              <a:spcBef>
-                <a:spcPts val="1200"/>
-              </a:spcBef>
-              <a:spcAft>
-                <a:spcPts val="1200"/>
-              </a:spcAft>
-              <a:buNone/>
-            </a:pPr>
-            <a:r>
-              <a:rPr lang="en">
-                <a:solidFill>
-                  <a:schemeClr val="dk1"/>
-                </a:solidFill>
-                <a:latin typeface="Courier New"/>
-                <a:ea typeface="Courier New"/>
-                <a:cs typeface="Courier New"/>
-                <a:sym typeface="Courier New"/>
-              </a:rPr>
-              <a:t>console.log(b);</a:t>
-            </a:r>
-            <a:endParaRPr>
-              <a:solidFill>
-                <a:schemeClr val="dk1"/>
-              </a:solidFill>
-              <a:latin typeface="Courier New"/>
-              <a:ea typeface="Courier New"/>
-              <a:cs typeface="Courier New"/>
-              <a:sym typeface="Courier New"/>
-            </a:endParaRPr>
-          </a:p>
-        </p:txBody>
-      </p:sp>
-    </p:spTree>
-  </p:cSld>
-  <p:clrMapOvr>
-    <a:masterClrMapping/>
-  </p:clrMapOvr>
-</p:sld>
-</file>
-
-<file path=ppt/slides/slide22.xml><?xml version="1.0" encoding="utf-8"?>
-<p:sld xmlns:a="http://schemas.openxmlformats.org/drawingml/2006/main" xmlns:r="http://schemas.openxmlformats.org/officeDocument/2006/relationships" xmlns:mc="http://schemas.openxmlformats.org/markup-compatibility/2006" xmlns:mv="urn:schemas-microsoft-com:mac:vml" xmlns:p="http://schemas.openxmlformats.org/presentationml/2006/main" xmlns:c="http://schemas.openxmlformats.org/drawingml/2006/chart" xmlns:dgm="http://schemas.openxmlformats.org/drawingml/2006/diagram" xmlns:o="urn:schemas-microsoft-com:office:office" xmlns:v="urn:schemas-microsoft-com:vml" xmlns:pvml="urn:schemas-microsoft-com:office:powerpoint" xmlns:com="http://schemas.openxmlformats.org/drawingml/2006/compatibility" xmlns:p14="http://schemas.microsoft.com/office/powerpoint/2010/main" xmlns:p15="http://schemas.microsoft.com/office/powerpoint/2012/main" xmlns:ahyp="http://schemas.microsoft.com/office/drawing/2018/hyperlinkcolor">
-  <p:cSld>
-    <p:spTree>
-      <p:nvGrpSpPr>
-        <p:cNvPr id="210" name="Shape 210"/>
-        <p:cNvGrpSpPr/>
-        <p:nvPr/>
-      </p:nvGrpSpPr>
-      <p:grpSpPr>
-        <a:xfrm>
-          <a:off x="0" y="0"/>
-          <a:ext cx="0" cy="0"/>
-          <a:chOff x="0" y="0"/>
-          <a:chExt cx="0" cy="0"/>
-        </a:xfrm>
-      </p:grpSpPr>
-      <p:sp>
-        <p:nvSpPr>
-          <p:cNvPr id="211" name="Google Shape;211;p35"/>
-          <p:cNvSpPr txBox="1"/>
-          <p:nvPr>
-            <p:ph type="title"/>
-          </p:nvPr>
-        </p:nvSpPr>
-        <p:spPr>
-          <a:xfrm>
-            <a:off x="0" y="0"/>
-            <a:ext cx="9144000" cy="572700"/>
-          </a:xfrm>
-          <a:prstGeom prst="rect">
-            <a:avLst/>
-          </a:prstGeom>
-        </p:spPr>
-        <p:txBody>
-          <a:bodyPr anchorCtr="0" anchor="t" bIns="91425" lIns="91425" spcFirstLastPara="1" rIns="91425" wrap="square" tIns="91425">
-            <a:noAutofit/>
-          </a:bodyPr>
-          <a:lstStyle/>
-          <a:p>
-            <a:pPr indent="0" lvl="0" marL="0" rtl="0" algn="l">
-              <a:spcBef>
-                <a:spcPts val="0"/>
-              </a:spcBef>
-              <a:spcAft>
-                <a:spcPts val="0"/>
-              </a:spcAft>
-              <a:buNone/>
-            </a:pPr>
-            <a:r>
-              <a:rPr lang="en" sz="3000">
-                <a:latin typeface="Times New Roman"/>
-                <a:ea typeface="Times New Roman"/>
-                <a:cs typeface="Times New Roman"/>
-                <a:sym typeface="Times New Roman"/>
-              </a:rPr>
-              <a:t>Function declaration and call comparison</a:t>
-            </a:r>
-            <a:endParaRPr sz="3000">
-              <a:latin typeface="Times New Roman"/>
-              <a:ea typeface="Times New Roman"/>
-              <a:cs typeface="Times New Roman"/>
-              <a:sym typeface="Times New Roman"/>
-            </a:endParaRPr>
-          </a:p>
-        </p:txBody>
-      </p:sp>
-      <p:sp>
-        <p:nvSpPr>
-          <p:cNvPr id="212" name="Google Shape;212;p35"/>
-          <p:cNvSpPr txBox="1"/>
-          <p:nvPr>
-            <p:ph idx="1" type="body"/>
-          </p:nvPr>
-        </p:nvSpPr>
-        <p:spPr>
-          <a:xfrm>
-            <a:off x="4133100" y="572700"/>
-            <a:ext cx="5010900" cy="4570800"/>
-          </a:xfrm>
-          <a:prstGeom prst="rect">
-            <a:avLst/>
-          </a:prstGeom>
-        </p:spPr>
-        <p:txBody>
-          <a:bodyPr anchorCtr="0" anchor="t" bIns="91425" lIns="91425" spcFirstLastPara="1" rIns="91425" wrap="square" tIns="91425">
-            <a:normAutofit/>
-          </a:bodyPr>
-          <a:lstStyle/>
-          <a:p>
-            <a:pPr indent="0" lvl="0" marL="0" rtl="0" algn="l">
-              <a:spcBef>
-                <a:spcPts val="0"/>
-              </a:spcBef>
-              <a:spcAft>
-                <a:spcPts val="0"/>
-              </a:spcAft>
-              <a:buNone/>
-            </a:pPr>
-            <a:r>
-              <a:rPr b="1" lang="en">
-                <a:solidFill>
-                  <a:schemeClr val="dk1"/>
-                </a:solidFill>
-                <a:latin typeface="Courier New"/>
-                <a:ea typeface="Courier New"/>
-                <a:cs typeface="Courier New"/>
-                <a:sym typeface="Courier New"/>
-              </a:rPr>
-              <a:t>const</a:t>
-            </a:r>
-            <a:r>
-              <a:rPr lang="en">
-                <a:solidFill>
-                  <a:schemeClr val="dk1"/>
-                </a:solidFill>
-                <a:latin typeface="Courier New"/>
-                <a:ea typeface="Courier New"/>
-                <a:cs typeface="Courier New"/>
-                <a:sym typeface="Courier New"/>
-              </a:rPr>
-              <a:t> multiplyByThree = function(a)</a:t>
-            </a:r>
-            <a:endParaRPr>
-              <a:solidFill>
-                <a:schemeClr val="dk1"/>
-              </a:solidFill>
-              <a:latin typeface="Courier New"/>
-              <a:ea typeface="Courier New"/>
-              <a:cs typeface="Courier New"/>
-              <a:sym typeface="Courier New"/>
-            </a:endParaRPr>
-          </a:p>
-          <a:p>
-            <a:pPr indent="0" lvl="0" marL="0" rtl="0" algn="l">
-              <a:spcBef>
-                <a:spcPts val="1200"/>
-              </a:spcBef>
-              <a:spcAft>
-                <a:spcPts val="0"/>
-              </a:spcAft>
-              <a:buNone/>
-            </a:pPr>
-            <a:r>
-              <a:rPr lang="en">
-                <a:solidFill>
-                  <a:schemeClr val="dk1"/>
-                </a:solidFill>
-                <a:latin typeface="Courier New"/>
-                <a:ea typeface="Courier New"/>
-                <a:cs typeface="Courier New"/>
-                <a:sym typeface="Courier New"/>
-              </a:rPr>
-              <a:t>{</a:t>
-            </a:r>
-            <a:endParaRPr>
-              <a:solidFill>
-                <a:schemeClr val="dk1"/>
-              </a:solidFill>
-              <a:latin typeface="Courier New"/>
-              <a:ea typeface="Courier New"/>
-              <a:cs typeface="Courier New"/>
-              <a:sym typeface="Courier New"/>
-            </a:endParaRPr>
-          </a:p>
-          <a:p>
-            <a:pPr indent="457200" lvl="0" marL="0" rtl="0" algn="l">
-              <a:spcBef>
-                <a:spcPts val="1200"/>
-              </a:spcBef>
-              <a:spcAft>
-                <a:spcPts val="0"/>
-              </a:spcAft>
-              <a:buNone/>
-            </a:pPr>
-            <a:r>
-              <a:rPr lang="en">
-                <a:solidFill>
-                  <a:schemeClr val="dk1"/>
-                </a:solidFill>
-                <a:latin typeface="Courier New"/>
-                <a:ea typeface="Courier New"/>
-                <a:cs typeface="Courier New"/>
-                <a:sym typeface="Courier New"/>
-              </a:rPr>
-              <a:t>return a * 3;</a:t>
-            </a:r>
-            <a:endParaRPr>
-              <a:solidFill>
-                <a:schemeClr val="dk1"/>
-              </a:solidFill>
-              <a:latin typeface="Courier New"/>
-              <a:ea typeface="Courier New"/>
-              <a:cs typeface="Courier New"/>
-              <a:sym typeface="Courier New"/>
-            </a:endParaRPr>
-          </a:p>
-          <a:p>
-            <a:pPr indent="0" lvl="0" marL="0" rtl="0" algn="l">
-              <a:spcBef>
-                <a:spcPts val="1200"/>
-              </a:spcBef>
-              <a:spcAft>
-                <a:spcPts val="0"/>
-              </a:spcAft>
-              <a:buNone/>
-            </a:pPr>
-            <a:r>
-              <a:rPr lang="en">
-                <a:solidFill>
-                  <a:schemeClr val="dk1"/>
-                </a:solidFill>
-                <a:latin typeface="Courier New"/>
-                <a:ea typeface="Courier New"/>
-                <a:cs typeface="Courier New"/>
-                <a:sym typeface="Courier New"/>
-              </a:rPr>
-              <a:t>}</a:t>
-            </a:r>
-            <a:endParaRPr>
-              <a:solidFill>
-                <a:schemeClr val="dk1"/>
-              </a:solidFill>
-              <a:latin typeface="Courier New"/>
-              <a:ea typeface="Courier New"/>
-              <a:cs typeface="Courier New"/>
-              <a:sym typeface="Courier New"/>
-            </a:endParaRPr>
-          </a:p>
-          <a:p>
-            <a:pPr indent="0" lvl="0" marL="0" rtl="0" algn="l">
-              <a:spcBef>
-                <a:spcPts val="1200"/>
-              </a:spcBef>
-              <a:spcAft>
-                <a:spcPts val="0"/>
-              </a:spcAft>
-              <a:buNone/>
-            </a:pPr>
-            <a:r>
-              <a:rPr lang="en">
-                <a:solidFill>
-                  <a:schemeClr val="dk1"/>
-                </a:solidFill>
-                <a:latin typeface="Courier New"/>
-                <a:ea typeface="Courier New"/>
-                <a:cs typeface="Courier New"/>
-                <a:sym typeface="Courier New"/>
-              </a:rPr>
-              <a:t>let a = 3;</a:t>
-            </a:r>
-            <a:endParaRPr>
-              <a:solidFill>
-                <a:schemeClr val="dk1"/>
-              </a:solidFill>
-              <a:latin typeface="Courier New"/>
-              <a:ea typeface="Courier New"/>
-              <a:cs typeface="Courier New"/>
-              <a:sym typeface="Courier New"/>
-            </a:endParaRPr>
-          </a:p>
-          <a:p>
-            <a:pPr indent="0" lvl="0" marL="0" rtl="0" algn="l">
-              <a:spcBef>
-                <a:spcPts val="1200"/>
-              </a:spcBef>
-              <a:spcAft>
-                <a:spcPts val="0"/>
-              </a:spcAft>
-              <a:buNone/>
-            </a:pPr>
-            <a:r>
-              <a:rPr lang="en">
-                <a:solidFill>
-                  <a:schemeClr val="dk1"/>
-                </a:solidFill>
-                <a:latin typeface="Courier New"/>
-                <a:ea typeface="Courier New"/>
-                <a:cs typeface="Courier New"/>
-                <a:sym typeface="Courier New"/>
-              </a:rPr>
-              <a:t>let b = multiplyByThree(a);</a:t>
-            </a:r>
-            <a:endParaRPr>
-              <a:solidFill>
-                <a:schemeClr val="dk1"/>
-              </a:solidFill>
-              <a:latin typeface="Courier New"/>
-              <a:ea typeface="Courier New"/>
-              <a:cs typeface="Courier New"/>
-              <a:sym typeface="Courier New"/>
-            </a:endParaRPr>
-          </a:p>
-          <a:p>
-            <a:pPr indent="0" lvl="0" marL="0" rtl="0" algn="l">
-              <a:spcBef>
-                <a:spcPts val="1200"/>
-              </a:spcBef>
-              <a:spcAft>
-                <a:spcPts val="1200"/>
-              </a:spcAft>
-              <a:buNone/>
-            </a:pPr>
-            <a:r>
-              <a:rPr lang="en">
-                <a:solidFill>
-                  <a:schemeClr val="dk1"/>
-                </a:solidFill>
-                <a:latin typeface="Courier New"/>
-                <a:ea typeface="Courier New"/>
-                <a:cs typeface="Courier New"/>
-                <a:sym typeface="Courier New"/>
-              </a:rPr>
-              <a:t>console.log(b);</a:t>
-            </a:r>
-            <a:endParaRPr>
-              <a:solidFill>
-                <a:schemeClr val="dk1"/>
-              </a:solidFill>
-              <a:latin typeface="Courier New"/>
-              <a:ea typeface="Courier New"/>
-              <a:cs typeface="Courier New"/>
-              <a:sym typeface="Courier New"/>
-            </a:endParaRPr>
-          </a:p>
-        </p:txBody>
-      </p:sp>
-      <p:sp>
-        <p:nvSpPr>
-          <p:cNvPr id="213" name="Google Shape;213;p35"/>
-          <p:cNvSpPr txBox="1"/>
-          <p:nvPr>
-            <p:ph idx="1" type="body"/>
-          </p:nvPr>
-        </p:nvSpPr>
-        <p:spPr>
-          <a:xfrm>
-            <a:off x="0" y="572700"/>
-            <a:ext cx="4133100" cy="4570800"/>
-          </a:xfrm>
-          <a:prstGeom prst="rect">
-            <a:avLst/>
-          </a:prstGeom>
-        </p:spPr>
-        <p:txBody>
-          <a:bodyPr anchorCtr="0" anchor="t" bIns="91425" lIns="91425" spcFirstLastPara="1" rIns="91425" wrap="square" tIns="91425">
-            <a:normAutofit/>
-          </a:bodyPr>
-          <a:lstStyle/>
-          <a:p>
-            <a:pPr indent="0" lvl="0" marL="0" rtl="0" algn="l">
-              <a:spcBef>
-                <a:spcPts val="0"/>
-              </a:spcBef>
-              <a:spcAft>
-                <a:spcPts val="0"/>
-              </a:spcAft>
-              <a:buNone/>
-            </a:pPr>
-            <a:r>
-              <a:rPr lang="en">
-                <a:solidFill>
-                  <a:schemeClr val="dk1"/>
-                </a:solidFill>
-                <a:latin typeface="Courier New"/>
-                <a:ea typeface="Courier New"/>
-                <a:cs typeface="Courier New"/>
-                <a:sym typeface="Courier New"/>
-              </a:rPr>
-              <a:t>function multiplyByTwo(a)</a:t>
-            </a:r>
-            <a:endParaRPr>
-              <a:solidFill>
-                <a:schemeClr val="dk1"/>
-              </a:solidFill>
-              <a:latin typeface="Courier New"/>
-              <a:ea typeface="Courier New"/>
-              <a:cs typeface="Courier New"/>
-              <a:sym typeface="Courier New"/>
-            </a:endParaRPr>
-          </a:p>
-          <a:p>
-            <a:pPr indent="0" lvl="0" marL="0" rtl="0" algn="l">
-              <a:spcBef>
-                <a:spcPts val="1200"/>
-              </a:spcBef>
-              <a:spcAft>
-                <a:spcPts val="0"/>
-              </a:spcAft>
-              <a:buNone/>
-            </a:pPr>
-            <a:r>
-              <a:rPr lang="en">
-                <a:solidFill>
-                  <a:schemeClr val="dk1"/>
-                </a:solidFill>
-                <a:latin typeface="Courier New"/>
-                <a:ea typeface="Courier New"/>
-                <a:cs typeface="Courier New"/>
-                <a:sym typeface="Courier New"/>
-              </a:rPr>
-              <a:t>{</a:t>
-            </a:r>
-            <a:endParaRPr>
-              <a:solidFill>
-                <a:schemeClr val="dk1"/>
-              </a:solidFill>
-              <a:latin typeface="Courier New"/>
-              <a:ea typeface="Courier New"/>
-              <a:cs typeface="Courier New"/>
-              <a:sym typeface="Courier New"/>
-            </a:endParaRPr>
-          </a:p>
-          <a:p>
-            <a:pPr indent="0" lvl="0" marL="0" rtl="0" algn="l">
-              <a:spcBef>
-                <a:spcPts val="1200"/>
-              </a:spcBef>
-              <a:spcAft>
-                <a:spcPts val="0"/>
-              </a:spcAft>
-              <a:buNone/>
-            </a:pPr>
-            <a:r>
-              <a:rPr lang="en">
-                <a:solidFill>
-                  <a:schemeClr val="dk1"/>
-                </a:solidFill>
-                <a:latin typeface="Courier New"/>
-                <a:ea typeface="Courier New"/>
-                <a:cs typeface="Courier New"/>
-                <a:sym typeface="Courier New"/>
-              </a:rPr>
-              <a:t>	return a * 2;</a:t>
-            </a:r>
-            <a:endParaRPr>
-              <a:solidFill>
-                <a:schemeClr val="dk1"/>
-              </a:solidFill>
-              <a:latin typeface="Courier New"/>
-              <a:ea typeface="Courier New"/>
-              <a:cs typeface="Courier New"/>
-              <a:sym typeface="Courier New"/>
-            </a:endParaRPr>
-          </a:p>
-          <a:p>
-            <a:pPr indent="0" lvl="0" marL="0" rtl="0" algn="l">
-              <a:spcBef>
-                <a:spcPts val="1200"/>
-              </a:spcBef>
-              <a:spcAft>
-                <a:spcPts val="0"/>
-              </a:spcAft>
-              <a:buNone/>
-            </a:pPr>
-            <a:r>
-              <a:rPr lang="en">
-                <a:solidFill>
-                  <a:schemeClr val="dk1"/>
-                </a:solidFill>
-                <a:latin typeface="Courier New"/>
-                <a:ea typeface="Courier New"/>
-                <a:cs typeface="Courier New"/>
-                <a:sym typeface="Courier New"/>
-              </a:rPr>
-              <a:t>}</a:t>
-            </a:r>
-            <a:endParaRPr>
-              <a:solidFill>
-                <a:schemeClr val="dk1"/>
-              </a:solidFill>
-              <a:latin typeface="Courier New"/>
-              <a:ea typeface="Courier New"/>
-              <a:cs typeface="Courier New"/>
-              <a:sym typeface="Courier New"/>
-            </a:endParaRPr>
-          </a:p>
-          <a:p>
-            <a:pPr indent="0" lvl="0" marL="0" rtl="0" algn="l">
-              <a:spcBef>
-                <a:spcPts val="1200"/>
-              </a:spcBef>
-              <a:spcAft>
-                <a:spcPts val="0"/>
-              </a:spcAft>
-              <a:buNone/>
-            </a:pPr>
-            <a:r>
-              <a:rPr lang="en">
-                <a:solidFill>
-                  <a:schemeClr val="dk1"/>
-                </a:solidFill>
-                <a:latin typeface="Courier New"/>
-                <a:ea typeface="Courier New"/>
-                <a:cs typeface="Courier New"/>
-                <a:sym typeface="Courier New"/>
-              </a:rPr>
-              <a:t>let a = 3;</a:t>
-            </a:r>
-            <a:endParaRPr>
-              <a:solidFill>
-                <a:schemeClr val="dk1"/>
-              </a:solidFill>
-              <a:latin typeface="Courier New"/>
-              <a:ea typeface="Courier New"/>
-              <a:cs typeface="Courier New"/>
-              <a:sym typeface="Courier New"/>
-            </a:endParaRPr>
-          </a:p>
-          <a:p>
-            <a:pPr indent="0" lvl="0" marL="0" rtl="0" algn="l">
-              <a:spcBef>
-                <a:spcPts val="1200"/>
-              </a:spcBef>
-              <a:spcAft>
-                <a:spcPts val="0"/>
-              </a:spcAft>
-              <a:buNone/>
-            </a:pPr>
-            <a:r>
-              <a:rPr lang="en">
-                <a:solidFill>
-                  <a:schemeClr val="dk1"/>
-                </a:solidFill>
-                <a:latin typeface="Courier New"/>
-                <a:ea typeface="Courier New"/>
-                <a:cs typeface="Courier New"/>
-                <a:sym typeface="Courier New"/>
-              </a:rPr>
-              <a:t>let b = multiplyByTwo(a);</a:t>
-            </a:r>
-            <a:endParaRPr>
-              <a:solidFill>
-                <a:schemeClr val="dk1"/>
-              </a:solidFill>
-              <a:latin typeface="Courier New"/>
-              <a:ea typeface="Courier New"/>
-              <a:cs typeface="Courier New"/>
-              <a:sym typeface="Courier New"/>
-            </a:endParaRPr>
-          </a:p>
-          <a:p>
-            <a:pPr indent="0" lvl="0" marL="0" rtl="0" algn="l">
-              <a:spcBef>
-                <a:spcPts val="1200"/>
-              </a:spcBef>
-              <a:spcAft>
-                <a:spcPts val="1200"/>
-              </a:spcAft>
-              <a:buNone/>
-            </a:pPr>
-            <a:r>
-              <a:rPr lang="en">
-                <a:solidFill>
-                  <a:schemeClr val="dk1"/>
-                </a:solidFill>
-                <a:latin typeface="Courier New"/>
-                <a:ea typeface="Courier New"/>
-                <a:cs typeface="Courier New"/>
-                <a:sym typeface="Courier New"/>
-              </a:rPr>
-              <a:t>console.log(b);</a:t>
-            </a:r>
-            <a:endParaRPr>
-              <a:solidFill>
-                <a:schemeClr val="dk1"/>
-              </a:solidFill>
-              <a:latin typeface="Courier New"/>
-              <a:ea typeface="Courier New"/>
-              <a:cs typeface="Courier New"/>
-              <a:sym typeface="Courier New"/>
-            </a:endParaRPr>
-          </a:p>
-        </p:txBody>
-      </p:sp>
-      <p:sp>
-        <p:nvSpPr>
-          <p:cNvPr id="214" name="Google Shape;214;p35"/>
-          <p:cNvSpPr txBox="1"/>
-          <p:nvPr/>
-        </p:nvSpPr>
-        <p:spPr>
-          <a:xfrm>
-            <a:off x="-12" y="4767600"/>
-            <a:ext cx="9144000" cy="375900"/>
-          </a:xfrm>
-          <a:prstGeom prst="rect">
-            <a:avLst/>
-          </a:prstGeom>
-          <a:noFill/>
-          <a:ln>
-            <a:noFill/>
-          </a:ln>
-        </p:spPr>
-        <p:txBody>
-          <a:bodyPr anchorCtr="0" anchor="t" bIns="91425" lIns="91425" spcFirstLastPara="1" rIns="91425" wrap="square" tIns="91425">
-            <a:spAutoFit/>
-          </a:bodyPr>
-          <a:lstStyle/>
-          <a:p>
-            <a:pPr indent="0" lvl="0" marL="12700" marR="259715" rtl="0" algn="ctr">
-              <a:lnSpc>
-                <a:spcPct val="88700"/>
-              </a:lnSpc>
-              <a:spcBef>
-                <a:spcPts val="0"/>
-              </a:spcBef>
-              <a:spcAft>
-                <a:spcPts val="0"/>
-              </a:spcAft>
-              <a:buNone/>
-            </a:pPr>
-            <a:r>
-              <a:rPr b="1" lang="en">
-                <a:solidFill>
-                  <a:schemeClr val="dk1"/>
-                </a:solidFill>
-                <a:latin typeface="Times New Roman"/>
-                <a:ea typeface="Times New Roman"/>
-                <a:cs typeface="Times New Roman"/>
-                <a:sym typeface="Times New Roman"/>
-              </a:rPr>
               <a:t>9.html, </a:t>
             </a:r>
             <a:r>
@@ -14880,7 +14978,7 @@
   <p:cSld>
     <p:spTree>
       <p:nvGrpSpPr>
-        <p:cNvPr id="218" name="Shape 218"/>
+        <p:cNvPr id="217" name="Shape 217"/>
         <p:cNvGrpSpPr/>
         <p:nvPr/>
       </p:nvGrpSpPr>
@@ -14894,7 +14992,7 @@
       </p:grpSpPr>
       <p:sp>
         <p:nvSpPr>
-          <p:cNvPr id="219" name="Google Shape;219;p36"/>
+          <p:cNvPr id="218" name="Google Shape;218;p36"/>
           <p:cNvSpPr txBox="1"/>
           <p:nvPr>
             <p:ph idx="1" type="body"/>
@@ -15229,7 +15327,7 @@
       </p:sp>
       <p:sp>
         <p:nvSpPr>
-          <p:cNvPr id="220" name="Google Shape;220;p36"/>
+          <p:cNvPr id="219" name="Google Shape;219;p36"/>
           <p:cNvSpPr txBox="1"/>
           <p:nvPr>
             <p:ph type="title"/>
@@ -15260,16 +15358,26 @@
               <a:buNone/>
             </a:pPr>
             <a:r>
-              <a:rPr lang="en"/>
+              <a:rPr lang="en">
+                <a:latin typeface="Times New Roman"/>
+                <a:ea typeface="Times New Roman"/>
+                <a:cs typeface="Times New Roman"/>
+                <a:sym typeface="Times New Roman"/>
+              </a:rPr>
               <a:t>Function parameters and arguments</a:t>
             </a:r>
-            <a:endParaRPr/>
+            <a:endParaRPr>
+              <a:latin typeface="Times New Roman"/>
+              <a:ea typeface="Times New Roman"/>
+              <a:cs typeface="Times New Roman"/>
+              <a:sym typeface="Times New Roman"/>
+            </a:endParaRPr>
           </a:p>
         </p:txBody>
       </p:sp>
       <p:sp>
         <p:nvSpPr>
-          <p:cNvPr id="221" name="Google Shape;221;p36"/>
+          <p:cNvPr id="220" name="Google Shape;220;p36"/>
           <p:cNvSpPr txBox="1"/>
           <p:nvPr/>
         </p:nvSpPr>
@@ -15302,16 +15410,26 @@
               <a:buNone/>
             </a:pPr>
             <a:r>
-              <a:rPr lang="en"/>
+              <a:rPr lang="en">
+                <a:latin typeface="Times New Roman"/>
+                <a:ea typeface="Times New Roman"/>
+                <a:cs typeface="Times New Roman"/>
+                <a:sym typeface="Times New Roman"/>
+              </a:rPr>
               <a:t>https://www.w3schools.com/js/js_function_parameters.asp</a:t>
             </a:r>
-            <a:endParaRPr/>
+            <a:endParaRPr>
+              <a:latin typeface="Times New Roman"/>
+              <a:ea typeface="Times New Roman"/>
+              <a:cs typeface="Times New Roman"/>
+              <a:sym typeface="Times New Roman"/>
+            </a:endParaRPr>
           </a:p>
         </p:txBody>
       </p:sp>
       <p:sp>
         <p:nvSpPr>
-          <p:cNvPr id="222" name="Google Shape;222;p36"/>
+          <p:cNvPr id="221" name="Google Shape;221;p36"/>
           <p:cNvSpPr/>
           <p:nvPr/>
         </p:nvSpPr>
@@ -15364,7 +15482,7 @@
       </p:sp>
       <p:sp>
         <p:nvSpPr>
-          <p:cNvPr id="223" name="Google Shape;223;p36"/>
+          <p:cNvPr id="222" name="Google Shape;222;p36"/>
           <p:cNvSpPr/>
           <p:nvPr/>
         </p:nvSpPr>
@@ -15428,7 +15546,7 @@
   <p:cSld>
     <p:spTree>
       <p:nvGrpSpPr>
-        <p:cNvPr id="227" name="Shape 227"/>
+        <p:cNvPr id="226" name="Shape 226"/>
         <p:cNvGrpSpPr/>
         <p:nvPr/>
       </p:nvGrpSpPr>
@@ -15442,7 +15560,7 @@
       </p:grpSpPr>
       <p:sp>
         <p:nvSpPr>
-          <p:cNvPr id="228" name="Google Shape;228;p37"/>
+          <p:cNvPr id="227" name="Google Shape;227;p37"/>
           <p:cNvSpPr txBox="1"/>
           <p:nvPr>
             <p:ph type="title"/>
@@ -15493,7 +15611,7 @@
       </p:sp>
       <p:sp>
         <p:nvSpPr>
-          <p:cNvPr id="229" name="Google Shape;229;p37"/>
+          <p:cNvPr id="228" name="Google Shape;228;p37"/>
           <p:cNvSpPr txBox="1"/>
           <p:nvPr>
             <p:ph idx="1" type="body"/>
@@ -15686,7 +15804,7 @@
       </p:sp>
       <p:sp>
         <p:nvSpPr>
-          <p:cNvPr id="230" name="Google Shape;230;p37"/>
+          <p:cNvPr id="229" name="Google Shape;229;p37"/>
           <p:cNvSpPr txBox="1"/>
           <p:nvPr/>
         </p:nvSpPr>
@@ -15731,7 +15849,7 @@
                 <a:cs typeface="Times New Roman"/>
                 <a:sym typeface="Times New Roman"/>
               </a:rPr>
-              <a:t>11.html, 12.html</a:t>
+              <a:t>11.html</a:t>
             </a:r>
             <a:endParaRPr b="1">
               <a:solidFill>
@@ -15758,7 +15876,7 @@
   <p:cSld>
     <p:spTree>
       <p:nvGrpSpPr>
-        <p:cNvPr id="234" name="Shape 234"/>
+        <p:cNvPr id="233" name="Shape 233"/>
         <p:cNvGrpSpPr/>
         <p:nvPr/>
       </p:nvGrpSpPr>
@@ -15772,7 +15890,7 @@
       </p:grpSpPr>
       <p:sp>
         <p:nvSpPr>
-          <p:cNvPr id="235" name="Google Shape;235;p38"/>
+          <p:cNvPr id="234" name="Google Shape;234;p38"/>
           <p:cNvSpPr txBox="1"/>
           <p:nvPr>
             <p:ph type="title"/>
@@ -15822,7 +15940,7 @@
       </p:sp>
       <p:sp>
         <p:nvSpPr>
-          <p:cNvPr id="236" name="Google Shape;236;p38"/>
+          <p:cNvPr id="235" name="Google Shape;235;p38"/>
           <p:cNvSpPr txBox="1"/>
           <p:nvPr>
             <p:ph idx="1" type="body"/>
@@ -16062,7 +16180,7 @@
       </p:sp>
       <p:sp>
         <p:nvSpPr>
-          <p:cNvPr id="237" name="Google Shape;237;p38"/>
+          <p:cNvPr id="236" name="Google Shape;236;p38"/>
           <p:cNvSpPr txBox="1"/>
           <p:nvPr/>
         </p:nvSpPr>
@@ -16115,7 +16233,7 @@
   <p:cSld>
     <p:spTree>
       <p:nvGrpSpPr>
-        <p:cNvPr id="241" name="Shape 241"/>
+        <p:cNvPr id="240" name="Shape 240"/>
         <p:cNvGrpSpPr/>
         <p:nvPr/>
       </p:nvGrpSpPr>
@@ -16129,7 +16247,7 @@
       </p:grpSpPr>
       <p:sp>
         <p:nvSpPr>
-          <p:cNvPr id="242" name="Google Shape;242;p39"/>
+          <p:cNvPr id="241" name="Google Shape;241;p39"/>
           <p:cNvSpPr txBox="1"/>
           <p:nvPr>
             <p:ph type="title"/>
@@ -16179,7 +16297,7 @@
       </p:sp>
       <p:sp>
         <p:nvSpPr>
-          <p:cNvPr id="243" name="Google Shape;243;p39"/>
+          <p:cNvPr id="242" name="Google Shape;242;p39"/>
           <p:cNvSpPr txBox="1"/>
           <p:nvPr>
             <p:ph idx="1" type="body"/>
@@ -16558,7 +16676,7 @@
       </p:sp>
       <p:sp>
         <p:nvSpPr>
-          <p:cNvPr id="244" name="Google Shape;244;p39"/>
+          <p:cNvPr id="243" name="Google Shape;243;p39"/>
           <p:cNvSpPr txBox="1"/>
           <p:nvPr/>
         </p:nvSpPr>
@@ -16600,7 +16718,7 @@
       </p:sp>
       <p:sp>
         <p:nvSpPr>
-          <p:cNvPr id="245" name="Google Shape;245;p39"/>
+          <p:cNvPr id="244" name="Google Shape;244;p39"/>
           <p:cNvSpPr txBox="1"/>
           <p:nvPr/>
         </p:nvSpPr>
@@ -16645,7 +16763,7 @@
                 <a:cs typeface="Times New Roman"/>
                 <a:sym typeface="Times New Roman"/>
               </a:rPr>
-              <a:t>13.html, 15.html</a:t>
+              <a:t>12.html, 13.html</a:t>
             </a:r>
             <a:endParaRPr b="1">
               <a:solidFill>
@@ -16672,7 +16790,7 @@
   <p:cSld>
     <p:spTree>
       <p:nvGrpSpPr>
-        <p:cNvPr id="249" name="Shape 249"/>
+        <p:cNvPr id="248" name="Shape 248"/>
         <p:cNvGrpSpPr/>
         <p:nvPr/>
       </p:nvGrpSpPr>
@@ -16686,7 +16804,7 @@
       </p:grpSpPr>
       <p:sp>
         <p:nvSpPr>
-          <p:cNvPr id="250" name="Google Shape;250;p40"/>
+          <p:cNvPr id="249" name="Google Shape;249;p40"/>
           <p:cNvSpPr txBox="1"/>
           <p:nvPr>
             <p:ph type="title"/>
@@ -16736,7 +16854,7 @@
       </p:sp>
       <p:sp>
         <p:nvSpPr>
-          <p:cNvPr id="251" name="Google Shape;251;p40"/>
+          <p:cNvPr id="250" name="Google Shape;250;p40"/>
           <p:cNvSpPr txBox="1"/>
           <p:nvPr>
             <p:ph idx="1" type="body"/>
@@ -17110,7 +17228,7 @@
   <p:cSld>
     <p:spTree>
       <p:nvGrpSpPr>
-        <p:cNvPr id="71" name="Shape 71"/>
+        <p:cNvPr id="70" name="Shape 70"/>
         <p:cNvGrpSpPr/>
         <p:nvPr/>
       </p:nvGrpSpPr>
@@ -17124,7 +17242,7 @@
       </p:grpSpPr>
       <p:graphicFrame>
         <p:nvGraphicFramePr>
-          <p:cNvPr id="72" name="Google Shape;72;p16"/>
+          <p:cNvPr id="71" name="Google Shape;71;p16"/>
           <p:cNvGraphicFramePr/>
           <p:nvPr/>
         </p:nvGraphicFramePr>
@@ -17137,7 +17255,7 @@
             <a:tbl>
               <a:tblPr>
                 <a:noFill/>
-                <a:tableStyleId>{25582E17-411C-45B6-93AF-B3BD47618EEA}</a:tableStyleId>
+                <a:tableStyleId>{7E6412BE-6277-4D3E-B13E-E2AD28425036}</a:tableStyleId>
               </a:tblPr>
               <a:tblGrid>
                 <a:gridCol w="4572000"/>
@@ -17445,7 +17563,7 @@
       </p:graphicFrame>
       <p:sp>
         <p:nvSpPr>
-          <p:cNvPr id="73" name="Google Shape;73;p16"/>
+          <p:cNvPr id="72" name="Google Shape;72;p16"/>
           <p:cNvSpPr txBox="1"/>
           <p:nvPr>
             <p:ph type="title"/>
@@ -17496,7 +17614,7 @@
       </p:sp>
       <p:sp>
         <p:nvSpPr>
-          <p:cNvPr id="74" name="Google Shape;74;p16"/>
+          <p:cNvPr id="73" name="Google Shape;73;p16"/>
           <p:cNvSpPr txBox="1"/>
           <p:nvPr/>
         </p:nvSpPr>
@@ -17568,7 +17686,7 @@
   <p:cSld>
     <p:spTree>
       <p:nvGrpSpPr>
-        <p:cNvPr id="78" name="Shape 78"/>
+        <p:cNvPr id="77" name="Shape 77"/>
         <p:cNvGrpSpPr/>
         <p:nvPr/>
       </p:nvGrpSpPr>
@@ -17582,7 +17700,7 @@
       </p:grpSpPr>
       <p:sp>
         <p:nvSpPr>
-          <p:cNvPr id="79" name="Google Shape;79;p17"/>
+          <p:cNvPr id="78" name="Google Shape;78;p17"/>
           <p:cNvSpPr txBox="1"/>
           <p:nvPr>
             <p:ph type="title"/>
@@ -17633,7 +17751,7 @@
       </p:sp>
       <p:graphicFrame>
         <p:nvGraphicFramePr>
-          <p:cNvPr id="80" name="Google Shape;80;p17"/>
+          <p:cNvPr id="79" name="Google Shape;79;p17"/>
           <p:cNvGraphicFramePr/>
           <p:nvPr/>
         </p:nvGraphicFramePr>
@@ -17646,7 +17764,7 @@
             <a:tbl>
               <a:tblPr>
                 <a:noFill/>
-                <a:tableStyleId>{25582E17-411C-45B6-93AF-B3BD47618EEA}</a:tableStyleId>
+                <a:tableStyleId>{7E6412BE-6277-4D3E-B13E-E2AD28425036}</a:tableStyleId>
               </a:tblPr>
               <a:tblGrid>
                 <a:gridCol w="4572000"/>
@@ -17954,7 +18072,7 @@
       </p:graphicFrame>
       <p:sp>
         <p:nvSpPr>
-          <p:cNvPr id="81" name="Google Shape;81;p17"/>
+          <p:cNvPr id="80" name="Google Shape;80;p17"/>
           <p:cNvSpPr txBox="1"/>
           <p:nvPr/>
         </p:nvSpPr>
@@ -18011,7 +18129,7 @@
                 <a:cs typeface="Times New Roman"/>
                 <a:sym typeface="Times New Roman"/>
               </a:rPr>
-              <a:t>.html, 4.html, 5.html</a:t>
+              <a:t>.html, 4.html</a:t>
             </a:r>
             <a:endParaRPr b="1">
               <a:solidFill>
@@ -18038,7 +18156,7 @@
   <p:cSld>
     <p:spTree>
       <p:nvGrpSpPr>
-        <p:cNvPr id="85" name="Shape 85"/>
+        <p:cNvPr id="84" name="Shape 84"/>
         <p:cNvGrpSpPr/>
         <p:nvPr/>
       </p:nvGrpSpPr>
@@ -18052,7 +18170,7 @@
       </p:grpSpPr>
       <p:sp>
         <p:nvSpPr>
-          <p:cNvPr id="86" name="Google Shape;86;p18"/>
+          <p:cNvPr id="85" name="Google Shape;85;p18"/>
           <p:cNvSpPr txBox="1"/>
           <p:nvPr>
             <p:ph type="title"/>
@@ -18103,7 +18221,7 @@
       </p:sp>
       <p:sp>
         <p:nvSpPr>
-          <p:cNvPr id="87" name="Google Shape;87;p18"/>
+          <p:cNvPr id="86" name="Google Shape;86;p18"/>
           <p:cNvSpPr txBox="1"/>
           <p:nvPr/>
         </p:nvSpPr>
@@ -18148,7 +18266,7 @@
                 <a:cs typeface="Times New Roman"/>
                 <a:sym typeface="Times New Roman"/>
               </a:rPr>
-              <a:t>1</a:t>
+              <a:t>5</a:t>
             </a:r>
             <a:r>
               <a:rPr b="1" lang="en">
@@ -18176,7 +18294,7 @@
       </p:sp>
       <p:sp>
         <p:nvSpPr>
-          <p:cNvPr id="88" name="Google Shape;88;p18"/>
+          <p:cNvPr id="87" name="Google Shape;87;p18"/>
           <p:cNvSpPr/>
           <p:nvPr/>
         </p:nvSpPr>
@@ -18400,7 +18518,7 @@
       </p:sp>
       <p:sp>
         <p:nvSpPr>
-          <p:cNvPr id="89" name="Google Shape;89;p18"/>
+          <p:cNvPr id="88" name="Google Shape;88;p18"/>
           <p:cNvSpPr/>
           <p:nvPr/>
         </p:nvSpPr>
@@ -18512,7 +18630,7 @@
   <p:cSld>
     <p:spTree>
       <p:nvGrpSpPr>
-        <p:cNvPr id="93" name="Shape 93"/>
+        <p:cNvPr id="92" name="Shape 92"/>
         <p:cNvGrpSpPr/>
         <p:nvPr/>
       </p:nvGrpSpPr>
@@ -18526,7 +18644,7 @@
       </p:grpSpPr>
       <p:sp>
         <p:nvSpPr>
-          <p:cNvPr id="94" name="Google Shape;94;p19"/>
+          <p:cNvPr id="93" name="Google Shape;93;p19"/>
           <p:cNvSpPr txBox="1"/>
           <p:nvPr>
             <p:ph type="title"/>
@@ -18577,7 +18695,7 @@
       </p:sp>
       <p:sp>
         <p:nvSpPr>
-          <p:cNvPr id="95" name="Google Shape;95;p19"/>
+          <p:cNvPr id="94" name="Google Shape;94;p19"/>
           <p:cNvSpPr txBox="1"/>
           <p:nvPr/>
         </p:nvSpPr>
@@ -18622,7 +18740,19 @@
                 <a:cs typeface="Times New Roman"/>
                 <a:sym typeface="Times New Roman"/>
               </a:rPr>
-              <a:t>1.html</a:t>
+              <a:t>5</a:t>
+            </a:r>
+            <a:r>
+              <a:rPr b="1" lang="en">
+                <a:solidFill>
+                  <a:schemeClr val="dk1"/>
+                </a:solidFill>
+                <a:latin typeface="Times New Roman"/>
+                <a:ea typeface="Times New Roman"/>
+                <a:cs typeface="Times New Roman"/>
+                <a:sym typeface="Times New Roman"/>
+              </a:rPr>
+              <a:t>.html</a:t>
             </a:r>
             <a:endParaRPr b="1">
               <a:solidFill>
@@ -18638,7 +18768,7 @@
       </p:sp>
       <p:sp>
         <p:nvSpPr>
-          <p:cNvPr id="96" name="Google Shape;96;p19"/>
+          <p:cNvPr id="95" name="Google Shape;95;p19"/>
           <p:cNvSpPr/>
           <p:nvPr/>
         </p:nvSpPr>
@@ -18999,7 +19129,7 @@
       </p:sp>
       <p:sp>
         <p:nvSpPr>
-          <p:cNvPr id="97" name="Google Shape;97;p19"/>
+          <p:cNvPr id="96" name="Google Shape;96;p19"/>
           <p:cNvSpPr/>
           <p:nvPr/>
         </p:nvSpPr>
@@ -19148,7 +19278,7 @@
   <p:cSld>
     <p:spTree>
       <p:nvGrpSpPr>
-        <p:cNvPr id="101" name="Shape 101"/>
+        <p:cNvPr id="100" name="Shape 100"/>
         <p:cNvGrpSpPr/>
         <p:nvPr/>
       </p:nvGrpSpPr>
@@ -19162,7 +19292,7 @@
       </p:grpSpPr>
       <p:sp>
         <p:nvSpPr>
-          <p:cNvPr id="102" name="Google Shape;102;p20"/>
+          <p:cNvPr id="101" name="Google Shape;101;p20"/>
           <p:cNvSpPr txBox="1"/>
           <p:nvPr>
             <p:ph type="title"/>
@@ -19213,7 +19343,7 @@
       </p:sp>
       <p:sp>
         <p:nvSpPr>
-          <p:cNvPr id="103" name="Google Shape;103;p20"/>
+          <p:cNvPr id="102" name="Google Shape;102;p20"/>
           <p:cNvSpPr txBox="1"/>
           <p:nvPr/>
         </p:nvSpPr>
@@ -19258,7 +19388,19 @@
                 <a:cs typeface="Times New Roman"/>
                 <a:sym typeface="Times New Roman"/>
               </a:rPr>
-              <a:t>1.html</a:t>
+              <a:t>5</a:t>
+            </a:r>
+            <a:r>
+              <a:rPr b="1" lang="en">
+                <a:solidFill>
+                  <a:schemeClr val="dk1"/>
+                </a:solidFill>
+                <a:latin typeface="Times New Roman"/>
+                <a:ea typeface="Times New Roman"/>
+                <a:cs typeface="Times New Roman"/>
+                <a:sym typeface="Times New Roman"/>
+              </a:rPr>
+              <a:t>.html</a:t>
             </a:r>
             <a:endParaRPr b="1">
               <a:solidFill>
@@ -19274,7 +19416,7 @@
       </p:sp>
       <p:sp>
         <p:nvSpPr>
-          <p:cNvPr id="104" name="Google Shape;104;p20"/>
+          <p:cNvPr id="103" name="Google Shape;103;p20"/>
           <p:cNvSpPr/>
           <p:nvPr/>
         </p:nvSpPr>
@@ -19320,7 +19462,7 @@
       </p:sp>
       <p:pic>
         <p:nvPicPr>
-          <p:cNvPr id="105" name="Google Shape;105;p20"/>
+          <p:cNvPr id="104" name="Google Shape;104;p20"/>
           <p:cNvPicPr preferRelativeResize="0"/>
           <p:nvPr/>
         </p:nvPicPr>
@@ -19347,7 +19489,7 @@
       </p:pic>
       <p:sp>
         <p:nvSpPr>
-          <p:cNvPr id="106" name="Google Shape;106;p20"/>
+          <p:cNvPr id="105" name="Google Shape;105;p20"/>
           <p:cNvSpPr/>
           <p:nvPr/>
         </p:nvSpPr>
@@ -19682,7 +19824,7 @@
   <p:cSld>
     <p:spTree>
       <p:nvGrpSpPr>
-        <p:cNvPr id="110" name="Shape 110"/>
+        <p:cNvPr id="109" name="Shape 109"/>
         <p:cNvGrpSpPr/>
         <p:nvPr/>
       </p:nvGrpSpPr>
@@ -19696,7 +19838,7 @@
       </p:grpSpPr>
       <p:sp>
         <p:nvSpPr>
-          <p:cNvPr id="111" name="Google Shape;111;p21"/>
+          <p:cNvPr id="110" name="Google Shape;110;p21"/>
           <p:cNvSpPr txBox="1"/>
           <p:nvPr>
             <p:ph type="title"/>
@@ -19747,7 +19889,7 @@
       </p:sp>
       <p:sp>
         <p:nvSpPr>
-          <p:cNvPr id="112" name="Google Shape;112;p21"/>
+          <p:cNvPr id="111" name="Google Shape;111;p21"/>
           <p:cNvSpPr txBox="1"/>
           <p:nvPr/>
         </p:nvSpPr>
@@ -19792,7 +19934,19 @@
                 <a:cs typeface="Times New Roman"/>
                 <a:sym typeface="Times New Roman"/>
               </a:rPr>
-              <a:t>1.html</a:t>
+              <a:t>5</a:t>
+            </a:r>
+            <a:r>
+              <a:rPr b="1" lang="en">
+                <a:solidFill>
+                  <a:schemeClr val="dk1"/>
+                </a:solidFill>
+                <a:latin typeface="Times New Roman"/>
+                <a:ea typeface="Times New Roman"/>
+                <a:cs typeface="Times New Roman"/>
+                <a:sym typeface="Times New Roman"/>
+              </a:rPr>
+              <a:t>.html</a:t>
             </a:r>
             <a:endParaRPr b="1">
               <a:solidFill>
@@ -19808,7 +19962,7 @@
       </p:sp>
       <p:sp>
         <p:nvSpPr>
-          <p:cNvPr id="113" name="Google Shape;113;p21"/>
+          <p:cNvPr id="112" name="Google Shape;112;p21"/>
           <p:cNvSpPr/>
           <p:nvPr/>
         </p:nvSpPr>
@@ -19854,7 +20008,7 @@
       </p:sp>
       <p:pic>
         <p:nvPicPr>
-          <p:cNvPr id="114" name="Google Shape;114;p21"/>
+          <p:cNvPr id="113" name="Google Shape;113;p21"/>
           <p:cNvPicPr preferRelativeResize="0"/>
           <p:nvPr/>
         </p:nvPicPr>
@@ -19881,7 +20035,7 @@
       </p:pic>
       <p:sp>
         <p:nvSpPr>
-          <p:cNvPr id="115" name="Google Shape;115;p21"/>
+          <p:cNvPr id="114" name="Google Shape;114;p21"/>
           <p:cNvSpPr/>
           <p:nvPr/>
         </p:nvSpPr>
@@ -20190,7 +20344,7 @@
       </p:sp>
       <p:sp>
         <p:nvSpPr>
-          <p:cNvPr id="116" name="Google Shape;116;p21"/>
+          <p:cNvPr id="115" name="Google Shape;115;p21"/>
           <p:cNvSpPr/>
           <p:nvPr/>
         </p:nvSpPr>
@@ -20429,7 +20583,7 @@
   <p:cSld>
     <p:spTree>
       <p:nvGrpSpPr>
-        <p:cNvPr id="120" name="Shape 120"/>
+        <p:cNvPr id="119" name="Shape 119"/>
         <p:cNvGrpSpPr/>
         <p:nvPr/>
       </p:nvGrpSpPr>
@@ -20443,7 +20597,7 @@
       </p:grpSpPr>
       <p:sp>
         <p:nvSpPr>
-          <p:cNvPr id="121" name="Google Shape;121;p22"/>
+          <p:cNvPr id="120" name="Google Shape;120;p22"/>
           <p:cNvSpPr txBox="1"/>
           <p:nvPr>
             <p:ph type="title"/>
@@ -20494,7 +20648,7 @@
       </p:sp>
       <p:sp>
         <p:nvSpPr>
-          <p:cNvPr id="122" name="Google Shape;122;p22"/>
+          <p:cNvPr id="121" name="Google Shape;121;p22"/>
           <p:cNvSpPr txBox="1"/>
           <p:nvPr/>
         </p:nvSpPr>
@@ -20539,7 +20693,19 @@
                 <a:cs typeface="Times New Roman"/>
                 <a:sym typeface="Times New Roman"/>
               </a:rPr>
-              <a:t>1.html</a:t>
+              <a:t>5</a:t>
+            </a:r>
+            <a:r>
+              <a:rPr b="1" lang="en">
+                <a:solidFill>
+                  <a:schemeClr val="dk1"/>
+                </a:solidFill>
+                <a:latin typeface="Times New Roman"/>
+                <a:ea typeface="Times New Roman"/>
+                <a:cs typeface="Times New Roman"/>
+                <a:sym typeface="Times New Roman"/>
+              </a:rPr>
+              <a:t>.html</a:t>
             </a:r>
             <a:endParaRPr b="1">
               <a:solidFill>
@@ -20555,7 +20721,7 @@
       </p:sp>
       <p:sp>
         <p:nvSpPr>
-          <p:cNvPr id="123" name="Google Shape;123;p22"/>
+          <p:cNvPr id="122" name="Google Shape;122;p22"/>
           <p:cNvSpPr/>
           <p:nvPr/>
         </p:nvSpPr>
@@ -20904,7 +21070,7 @@
       </p:sp>
       <p:sp>
         <p:nvSpPr>
-          <p:cNvPr id="124" name="Google Shape;124;p22"/>
+          <p:cNvPr id="123" name="Google Shape;123;p22"/>
           <p:cNvSpPr/>
           <p:nvPr/>
         </p:nvSpPr>

</xml_diff>